<commit_message>
adding in recorder hero mockup slide to ppt
</commit_message>
<xml_diff>
--- a/doc/Recorder Hero!.pptx
+++ b/doc/Recorder Hero!.pptx
@@ -197,7 +197,7 @@
           <a:p>
             <a:fld id="{397DFA39-70C4-4EBB-BCE0-970B3CBB8D37}" type="datetimeFigureOut">
               <a:rPr lang="en-US" smtClean="0"/>
-              <a:t>11/13/2012</a:t>
+              <a:t>11/14/12</a:t>
             </a:fld>
             <a:endParaRPr lang="en-US"/>
           </a:p>
@@ -730,7 +730,7 @@
           <a:p>
             <a:fld id="{25015B3F-09AE-4C75-8121-2572650268AD}" type="datetimeFigureOut">
               <a:rPr lang="en-US" smtClean="0"/>
-              <a:t>11/13/2012</a:t>
+              <a:t>11/14/12</a:t>
             </a:fld>
             <a:endParaRPr lang="en-US"/>
           </a:p>
@@ -900,7 +900,7 @@
           <a:p>
             <a:fld id="{25015B3F-09AE-4C75-8121-2572650268AD}" type="datetimeFigureOut">
               <a:rPr lang="en-US" smtClean="0"/>
-              <a:t>11/13/2012</a:t>
+              <a:t>11/14/12</a:t>
             </a:fld>
             <a:endParaRPr lang="en-US"/>
           </a:p>
@@ -1080,7 +1080,7 @@
           <a:p>
             <a:fld id="{25015B3F-09AE-4C75-8121-2572650268AD}" type="datetimeFigureOut">
               <a:rPr lang="en-US" smtClean="0"/>
-              <a:t>11/13/2012</a:t>
+              <a:t>11/14/12</a:t>
             </a:fld>
             <a:endParaRPr lang="en-US"/>
           </a:p>
@@ -1250,7 +1250,7 @@
           <a:p>
             <a:fld id="{25015B3F-09AE-4C75-8121-2572650268AD}" type="datetimeFigureOut">
               <a:rPr lang="en-US" smtClean="0"/>
-              <a:t>11/13/2012</a:t>
+              <a:t>11/14/12</a:t>
             </a:fld>
             <a:endParaRPr lang="en-US"/>
           </a:p>
@@ -1496,7 +1496,7 @@
           <a:p>
             <a:fld id="{25015B3F-09AE-4C75-8121-2572650268AD}" type="datetimeFigureOut">
               <a:rPr lang="en-US" smtClean="0"/>
-              <a:t>11/13/2012</a:t>
+              <a:t>11/14/12</a:t>
             </a:fld>
             <a:endParaRPr lang="en-US"/>
           </a:p>
@@ -1784,7 +1784,7 @@
           <a:p>
             <a:fld id="{25015B3F-09AE-4C75-8121-2572650268AD}" type="datetimeFigureOut">
               <a:rPr lang="en-US" smtClean="0"/>
-              <a:t>11/13/2012</a:t>
+              <a:t>11/14/12</a:t>
             </a:fld>
             <a:endParaRPr lang="en-US"/>
           </a:p>
@@ -2206,7 +2206,7 @@
           <a:p>
             <a:fld id="{25015B3F-09AE-4C75-8121-2572650268AD}" type="datetimeFigureOut">
               <a:rPr lang="en-US" smtClean="0"/>
-              <a:t>11/13/2012</a:t>
+              <a:t>11/14/12</a:t>
             </a:fld>
             <a:endParaRPr lang="en-US"/>
           </a:p>
@@ -2324,7 +2324,7 @@
           <a:p>
             <a:fld id="{25015B3F-09AE-4C75-8121-2572650268AD}" type="datetimeFigureOut">
               <a:rPr lang="en-US" smtClean="0"/>
-              <a:t>11/13/2012</a:t>
+              <a:t>11/14/12</a:t>
             </a:fld>
             <a:endParaRPr lang="en-US"/>
           </a:p>
@@ -2419,7 +2419,7 @@
           <a:p>
             <a:fld id="{25015B3F-09AE-4C75-8121-2572650268AD}" type="datetimeFigureOut">
               <a:rPr lang="en-US" smtClean="0"/>
-              <a:t>11/13/2012</a:t>
+              <a:t>11/14/12</a:t>
             </a:fld>
             <a:endParaRPr lang="en-US"/>
           </a:p>
@@ -2696,7 +2696,7 @@
           <a:p>
             <a:fld id="{25015B3F-09AE-4C75-8121-2572650268AD}" type="datetimeFigureOut">
               <a:rPr lang="en-US" smtClean="0"/>
-              <a:t>11/13/2012</a:t>
+              <a:t>11/14/12</a:t>
             </a:fld>
             <a:endParaRPr lang="en-US"/>
           </a:p>
@@ -2949,7 +2949,7 @@
           <a:p>
             <a:fld id="{25015B3F-09AE-4C75-8121-2572650268AD}" type="datetimeFigureOut">
               <a:rPr lang="en-US" smtClean="0"/>
-              <a:t>11/13/2012</a:t>
+              <a:t>11/14/12</a:t>
             </a:fld>
             <a:endParaRPr lang="en-US"/>
           </a:p>
@@ -3162,7 +3162,7 @@
           <a:p>
             <a:fld id="{25015B3F-09AE-4C75-8121-2572650268AD}" type="datetimeFigureOut">
               <a:rPr lang="en-US" smtClean="0"/>
-              <a:t>11/13/2012</a:t>
+              <a:t>11/14/12</a:t>
             </a:fld>
             <a:endParaRPr lang="en-US"/>
           </a:p>
@@ -3764,7 +3764,7 @@
           </a:prstGeom>
           <a:noFill/>
           <a:extLst>
-            <a:ext uri="{909E8E84-426E-40DD-AFC4-6F175D3DCCD1}">
+            <a:ext uri="{909E8E84-426E-40dd-AFC4-6F175D3DCCD1}">
               <a14:hiddenFill xmlns:a14="http://schemas.microsoft.com/office/drawing/2010/main">
                 <a:solidFill>
                   <a:srgbClr val="FFFFFF"/>
@@ -3820,6 +3820,14 @@
 <file path=ppt/slides/slide4.xml><?xml version="1.0" encoding="utf-8"?>
 <p:sld xmlns:a="http://schemas.openxmlformats.org/drawingml/2006/main" xmlns:r="http://schemas.openxmlformats.org/officeDocument/2006/relationships" xmlns:p="http://schemas.openxmlformats.org/presentationml/2006/main">
   <p:cSld>
+    <p:bg>
+      <p:bgPr>
+        <a:solidFill>
+          <a:schemeClr val="tx1"/>
+        </a:solidFill>
+        <a:effectLst/>
+      </p:bgPr>
+    </p:bg>
     <p:spTree>
       <p:nvGrpSpPr>
         <p:cNvPr id="1" name=""/>
@@ -3836,14 +3844,14 @@
       </p:grpSpPr>
       <p:sp>
         <p:nvSpPr>
-          <p:cNvPr id="2" name="TextBox 1"/>
+          <p:cNvPr id="3" name="TextBox 2"/>
           <p:cNvSpPr txBox="1"/>
           <p:nvPr/>
         </p:nvSpPr>
         <p:spPr>
           <a:xfrm>
-            <a:off x="1981200" y="1981200"/>
-            <a:ext cx="3505200" cy="369332"/>
+            <a:off x="0" y="1308424"/>
+            <a:ext cx="590143" cy="4524316"/>
           </a:xfrm>
           <a:prstGeom prst="rect">
             <a:avLst/>
@@ -3857,10 +3865,813 @@
           <a:lstStyle/>
           <a:p>
             <a:r>
-              <a:rPr lang="en-US" dirty="0" smtClean="0"/>
-              <a:t>Recorder Hero layout</a:t>
-            </a:r>
-            <a:endParaRPr lang="en-US" dirty="0"/>
+              <a:rPr lang="en-US" sz="3600" dirty="0" smtClean="0">
+                <a:solidFill>
+                  <a:srgbClr val="FFFFFF"/>
+                </a:solidFill>
+                <a:latin typeface="Courier"/>
+                <a:cs typeface="Courier"/>
+              </a:rPr>
+              <a:t>C</a:t>
+            </a:r>
+          </a:p>
+          <a:p>
+            <a:r>
+              <a:rPr lang="en-US" sz="3600" dirty="0" smtClean="0">
+                <a:solidFill>
+                  <a:srgbClr val="FFFFFF"/>
+                </a:solidFill>
+                <a:latin typeface="Courier"/>
+                <a:cs typeface="Courier"/>
+              </a:rPr>
+              <a:t>B</a:t>
+            </a:r>
+          </a:p>
+          <a:p>
+            <a:r>
+              <a:rPr lang="en-US" sz="3600" dirty="0" smtClean="0">
+                <a:solidFill>
+                  <a:srgbClr val="FFFFFF"/>
+                </a:solidFill>
+                <a:latin typeface="Courier"/>
+                <a:cs typeface="Courier"/>
+              </a:rPr>
+              <a:t>A</a:t>
+            </a:r>
+          </a:p>
+          <a:p>
+            <a:r>
+              <a:rPr lang="en-US" sz="3600" dirty="0" smtClean="0">
+                <a:solidFill>
+                  <a:srgbClr val="FFFFFF"/>
+                </a:solidFill>
+                <a:latin typeface="Courier"/>
+                <a:cs typeface="Courier"/>
+              </a:rPr>
+              <a:t>G</a:t>
+            </a:r>
+            <a:endParaRPr lang="en-US" sz="3600" dirty="0" smtClean="0">
+              <a:solidFill>
+                <a:srgbClr val="FFFFFF"/>
+              </a:solidFill>
+              <a:latin typeface="Courier"/>
+              <a:cs typeface="Courier"/>
+            </a:endParaRPr>
+          </a:p>
+          <a:p>
+            <a:r>
+              <a:rPr lang="en-US" sz="3600" dirty="0">
+                <a:solidFill>
+                  <a:srgbClr val="FFFFFF"/>
+                </a:solidFill>
+                <a:latin typeface="Courier"/>
+                <a:cs typeface="Courier"/>
+              </a:rPr>
+              <a:t>F</a:t>
+            </a:r>
+            <a:endParaRPr lang="en-US" sz="3600" dirty="0" smtClean="0">
+              <a:solidFill>
+                <a:srgbClr val="FFFFFF"/>
+              </a:solidFill>
+              <a:latin typeface="Courier"/>
+              <a:cs typeface="Courier"/>
+            </a:endParaRPr>
+          </a:p>
+          <a:p>
+            <a:r>
+              <a:rPr lang="en-US" sz="3600" dirty="0">
+                <a:solidFill>
+                  <a:srgbClr val="FFFFFF"/>
+                </a:solidFill>
+                <a:latin typeface="Courier"/>
+                <a:cs typeface="Courier"/>
+              </a:rPr>
+              <a:t>E</a:t>
+            </a:r>
+            <a:endParaRPr lang="en-US" sz="3600" dirty="0" smtClean="0">
+              <a:solidFill>
+                <a:srgbClr val="FFFFFF"/>
+              </a:solidFill>
+              <a:latin typeface="Courier"/>
+              <a:cs typeface="Courier"/>
+            </a:endParaRPr>
+          </a:p>
+          <a:p>
+            <a:r>
+              <a:rPr lang="en-US" sz="3600" dirty="0">
+                <a:solidFill>
+                  <a:srgbClr val="FFFFFF"/>
+                </a:solidFill>
+                <a:latin typeface="Courier"/>
+                <a:cs typeface="Courier"/>
+              </a:rPr>
+              <a:t>D</a:t>
+            </a:r>
+            <a:endParaRPr lang="en-US" sz="3600" dirty="0" smtClean="0">
+              <a:solidFill>
+                <a:srgbClr val="FFFFFF"/>
+              </a:solidFill>
+              <a:latin typeface="Courier"/>
+              <a:cs typeface="Courier"/>
+            </a:endParaRPr>
+          </a:p>
+          <a:p>
+            <a:r>
+              <a:rPr lang="en-US" sz="3600" dirty="0" smtClean="0">
+                <a:solidFill>
+                  <a:srgbClr val="FFFFFF"/>
+                </a:solidFill>
+                <a:latin typeface="Courier"/>
+                <a:cs typeface="Courier"/>
+              </a:rPr>
+              <a:t>C</a:t>
+            </a:r>
+          </a:p>
+        </p:txBody>
+      </p:sp>
+      <p:cxnSp>
+        <p:nvCxnSpPr>
+          <p:cNvPr id="4" name="Straight Connector 3"/>
+          <p:cNvCxnSpPr/>
+          <p:nvPr/>
+        </p:nvCxnSpPr>
+        <p:spPr>
+          <a:xfrm>
+            <a:off x="705605" y="1680426"/>
+            <a:ext cx="8185019" cy="0"/>
+          </a:xfrm>
+          <a:prstGeom prst="line">
+            <a:avLst/>
+          </a:prstGeom>
+          <a:ln>
+            <a:solidFill>
+              <a:schemeClr val="bg1">
+                <a:lumMod val="75000"/>
+              </a:schemeClr>
+            </a:solidFill>
+          </a:ln>
+        </p:spPr>
+        <p:style>
+          <a:lnRef idx="2">
+            <a:schemeClr val="accent1"/>
+          </a:lnRef>
+          <a:fillRef idx="0">
+            <a:schemeClr val="accent1"/>
+          </a:fillRef>
+          <a:effectRef idx="1">
+            <a:schemeClr val="accent1"/>
+          </a:effectRef>
+          <a:fontRef idx="minor">
+            <a:schemeClr val="tx1"/>
+          </a:fontRef>
+        </p:style>
+      </p:cxnSp>
+      <p:cxnSp>
+        <p:nvCxnSpPr>
+          <p:cNvPr id="5" name="Straight Connector 4"/>
+          <p:cNvCxnSpPr/>
+          <p:nvPr/>
+        </p:nvCxnSpPr>
+        <p:spPr>
+          <a:xfrm>
+            <a:off x="704055" y="2268967"/>
+            <a:ext cx="8185019" cy="0"/>
+          </a:xfrm>
+          <a:prstGeom prst="line">
+            <a:avLst/>
+          </a:prstGeom>
+          <a:ln>
+            <a:solidFill>
+              <a:schemeClr val="bg1">
+                <a:lumMod val="75000"/>
+              </a:schemeClr>
+            </a:solidFill>
+          </a:ln>
+        </p:spPr>
+        <p:style>
+          <a:lnRef idx="2">
+            <a:schemeClr val="accent1"/>
+          </a:lnRef>
+          <a:fillRef idx="0">
+            <a:schemeClr val="accent1"/>
+          </a:fillRef>
+          <a:effectRef idx="1">
+            <a:schemeClr val="accent1"/>
+          </a:effectRef>
+          <a:fontRef idx="minor">
+            <a:schemeClr val="tx1"/>
+          </a:fontRef>
+        </p:style>
+      </p:cxnSp>
+      <p:cxnSp>
+        <p:nvCxnSpPr>
+          <p:cNvPr id="6" name="Straight Connector 5"/>
+          <p:cNvCxnSpPr/>
+          <p:nvPr/>
+        </p:nvCxnSpPr>
+        <p:spPr>
+          <a:xfrm>
+            <a:off x="704055" y="2730764"/>
+            <a:ext cx="8185019" cy="0"/>
+          </a:xfrm>
+          <a:prstGeom prst="line">
+            <a:avLst/>
+          </a:prstGeom>
+          <a:ln>
+            <a:solidFill>
+              <a:schemeClr val="bg1">
+                <a:lumMod val="75000"/>
+              </a:schemeClr>
+            </a:solidFill>
+          </a:ln>
+        </p:spPr>
+        <p:style>
+          <a:lnRef idx="2">
+            <a:schemeClr val="accent1"/>
+          </a:lnRef>
+          <a:fillRef idx="0">
+            <a:schemeClr val="accent1"/>
+          </a:fillRef>
+          <a:effectRef idx="1">
+            <a:schemeClr val="accent1"/>
+          </a:effectRef>
+          <a:fontRef idx="minor">
+            <a:schemeClr val="tx1"/>
+          </a:fontRef>
+        </p:style>
+      </p:cxnSp>
+      <p:cxnSp>
+        <p:nvCxnSpPr>
+          <p:cNvPr id="7" name="Straight Connector 6"/>
+          <p:cNvCxnSpPr/>
+          <p:nvPr/>
+        </p:nvCxnSpPr>
+        <p:spPr>
+          <a:xfrm>
+            <a:off x="702505" y="3319305"/>
+            <a:ext cx="8185019" cy="0"/>
+          </a:xfrm>
+          <a:prstGeom prst="line">
+            <a:avLst/>
+          </a:prstGeom>
+          <a:ln>
+            <a:solidFill>
+              <a:schemeClr val="bg1">
+                <a:lumMod val="75000"/>
+              </a:schemeClr>
+            </a:solidFill>
+          </a:ln>
+        </p:spPr>
+        <p:style>
+          <a:lnRef idx="2">
+            <a:schemeClr val="accent1"/>
+          </a:lnRef>
+          <a:fillRef idx="0">
+            <a:schemeClr val="accent1"/>
+          </a:fillRef>
+          <a:effectRef idx="1">
+            <a:schemeClr val="accent1"/>
+          </a:effectRef>
+          <a:fontRef idx="minor">
+            <a:schemeClr val="tx1"/>
+          </a:fontRef>
+        </p:style>
+      </p:cxnSp>
+      <p:cxnSp>
+        <p:nvCxnSpPr>
+          <p:cNvPr id="8" name="Straight Connector 7"/>
+          <p:cNvCxnSpPr/>
+          <p:nvPr/>
+        </p:nvCxnSpPr>
+        <p:spPr>
+          <a:xfrm>
+            <a:off x="704055" y="3846772"/>
+            <a:ext cx="8185019" cy="0"/>
+          </a:xfrm>
+          <a:prstGeom prst="line">
+            <a:avLst/>
+          </a:prstGeom>
+          <a:ln>
+            <a:solidFill>
+              <a:schemeClr val="bg1">
+                <a:lumMod val="75000"/>
+              </a:schemeClr>
+            </a:solidFill>
+          </a:ln>
+        </p:spPr>
+        <p:style>
+          <a:lnRef idx="2">
+            <a:schemeClr val="accent1"/>
+          </a:lnRef>
+          <a:fillRef idx="0">
+            <a:schemeClr val="accent1"/>
+          </a:fillRef>
+          <a:effectRef idx="1">
+            <a:schemeClr val="accent1"/>
+          </a:effectRef>
+          <a:fontRef idx="minor">
+            <a:schemeClr val="tx1"/>
+          </a:fontRef>
+        </p:style>
+      </p:cxnSp>
+      <p:cxnSp>
+        <p:nvCxnSpPr>
+          <p:cNvPr id="9" name="Straight Connector 8"/>
+          <p:cNvCxnSpPr/>
+          <p:nvPr/>
+        </p:nvCxnSpPr>
+        <p:spPr>
+          <a:xfrm>
+            <a:off x="702505" y="4435313"/>
+            <a:ext cx="8185019" cy="0"/>
+          </a:xfrm>
+          <a:prstGeom prst="line">
+            <a:avLst/>
+          </a:prstGeom>
+          <a:ln>
+            <a:solidFill>
+              <a:schemeClr val="bg1">
+                <a:lumMod val="75000"/>
+              </a:schemeClr>
+            </a:solidFill>
+          </a:ln>
+        </p:spPr>
+        <p:style>
+          <a:lnRef idx="2">
+            <a:schemeClr val="accent1"/>
+          </a:lnRef>
+          <a:fillRef idx="0">
+            <a:schemeClr val="accent1"/>
+          </a:fillRef>
+          <a:effectRef idx="1">
+            <a:schemeClr val="accent1"/>
+          </a:effectRef>
+          <a:fontRef idx="minor">
+            <a:schemeClr val="tx1"/>
+          </a:fontRef>
+        </p:style>
+      </p:cxnSp>
+      <p:cxnSp>
+        <p:nvCxnSpPr>
+          <p:cNvPr id="10" name="Straight Connector 9"/>
+          <p:cNvCxnSpPr/>
+          <p:nvPr/>
+        </p:nvCxnSpPr>
+        <p:spPr>
+          <a:xfrm>
+            <a:off x="704055" y="4975608"/>
+            <a:ext cx="8185019" cy="0"/>
+          </a:xfrm>
+          <a:prstGeom prst="line">
+            <a:avLst/>
+          </a:prstGeom>
+          <a:ln>
+            <a:solidFill>
+              <a:schemeClr val="bg1">
+                <a:lumMod val="75000"/>
+              </a:schemeClr>
+            </a:solidFill>
+          </a:ln>
+        </p:spPr>
+        <p:style>
+          <a:lnRef idx="2">
+            <a:schemeClr val="accent1"/>
+          </a:lnRef>
+          <a:fillRef idx="0">
+            <a:schemeClr val="accent1"/>
+          </a:fillRef>
+          <a:effectRef idx="1">
+            <a:schemeClr val="accent1"/>
+          </a:effectRef>
+          <a:fontRef idx="minor">
+            <a:schemeClr val="tx1"/>
+          </a:fontRef>
+        </p:style>
+      </p:cxnSp>
+      <p:cxnSp>
+        <p:nvCxnSpPr>
+          <p:cNvPr id="11" name="Straight Connector 10"/>
+          <p:cNvCxnSpPr/>
+          <p:nvPr/>
+        </p:nvCxnSpPr>
+        <p:spPr>
+          <a:xfrm>
+            <a:off x="702505" y="5564149"/>
+            <a:ext cx="8185019" cy="0"/>
+          </a:xfrm>
+          <a:prstGeom prst="line">
+            <a:avLst/>
+          </a:prstGeom>
+          <a:ln>
+            <a:solidFill>
+              <a:schemeClr val="bg1">
+                <a:lumMod val="75000"/>
+              </a:schemeClr>
+            </a:solidFill>
+          </a:ln>
+        </p:spPr>
+        <p:style>
+          <a:lnRef idx="2">
+            <a:schemeClr val="accent1"/>
+          </a:lnRef>
+          <a:fillRef idx="0">
+            <a:schemeClr val="accent1"/>
+          </a:fillRef>
+          <a:effectRef idx="1">
+            <a:schemeClr val="accent1"/>
+          </a:effectRef>
+          <a:fontRef idx="minor">
+            <a:schemeClr val="tx1"/>
+          </a:fontRef>
+        </p:style>
+      </p:cxnSp>
+      <p:sp>
+        <p:nvSpPr>
+          <p:cNvPr id="12" name="Rectangle 11"/>
+          <p:cNvSpPr/>
+          <p:nvPr/>
+        </p:nvSpPr>
+        <p:spPr>
+          <a:xfrm>
+            <a:off x="692777" y="5374799"/>
+            <a:ext cx="538825" cy="282208"/>
+          </a:xfrm>
+          <a:prstGeom prst="rect">
+            <a:avLst/>
+          </a:prstGeom>
+          <a:solidFill>
+            <a:schemeClr val="bg1">
+              <a:lumMod val="95000"/>
+            </a:schemeClr>
+          </a:solidFill>
+          <a:ln>
+            <a:solidFill>
+              <a:schemeClr val="bg1"/>
+            </a:solidFill>
+          </a:ln>
+        </p:spPr>
+        <p:style>
+          <a:lnRef idx="1">
+            <a:schemeClr val="accent1"/>
+          </a:lnRef>
+          <a:fillRef idx="3">
+            <a:schemeClr val="accent1"/>
+          </a:fillRef>
+          <a:effectRef idx="2">
+            <a:schemeClr val="accent1"/>
+          </a:effectRef>
+          <a:fontRef idx="minor">
+            <a:schemeClr val="lt1"/>
+          </a:fontRef>
+        </p:style>
+        <p:txBody>
+          <a:bodyPr rtlCol="0" anchor="ctr"/>
+          <a:lstStyle/>
+          <a:p>
+            <a:pPr algn="ctr"/>
+            <a:endParaRPr lang="en-US"/>
+          </a:p>
+        </p:txBody>
+      </p:sp>
+      <p:sp>
+        <p:nvSpPr>
+          <p:cNvPr id="13" name="TextBox 12"/>
+          <p:cNvSpPr txBox="1"/>
+          <p:nvPr/>
+        </p:nvSpPr>
+        <p:spPr>
+          <a:xfrm>
+            <a:off x="5478061" y="205243"/>
+            <a:ext cx="1860232" cy="646331"/>
+          </a:xfrm>
+          <a:prstGeom prst="rect">
+            <a:avLst/>
+          </a:prstGeom>
+          <a:noFill/>
+        </p:spPr>
+        <p:txBody>
+          <a:bodyPr wrap="square" rtlCol="0">
+            <a:spAutoFit/>
+          </a:bodyPr>
+          <a:lstStyle/>
+          <a:p>
+            <a:r>
+              <a:rPr lang="en-US" dirty="0" smtClean="0">
+                <a:solidFill>
+                  <a:srgbClr val="FFFFFF"/>
+                </a:solidFill>
+                <a:latin typeface="Courier"/>
+                <a:cs typeface="Courier"/>
+              </a:rPr>
+              <a:t>SCORE: 54013</a:t>
+            </a:r>
+          </a:p>
+          <a:p>
+            <a:r>
+              <a:rPr lang="en-US" dirty="0" smtClean="0">
+                <a:solidFill>
+                  <a:srgbClr val="FFFFFF"/>
+                </a:solidFill>
+                <a:latin typeface="Courier"/>
+                <a:cs typeface="Courier"/>
+              </a:rPr>
+              <a:t>PITCH: C</a:t>
+            </a:r>
+            <a:endParaRPr lang="en-US" dirty="0">
+              <a:solidFill>
+                <a:srgbClr val="FFFFFF"/>
+              </a:solidFill>
+              <a:latin typeface="Courier"/>
+              <a:cs typeface="Courier"/>
+            </a:endParaRPr>
+          </a:p>
+        </p:txBody>
+      </p:sp>
+      <p:sp>
+        <p:nvSpPr>
+          <p:cNvPr id="14" name="Rectangle 13"/>
+          <p:cNvSpPr/>
+          <p:nvPr/>
+        </p:nvSpPr>
+        <p:spPr>
+          <a:xfrm>
+            <a:off x="1230053" y="4834504"/>
+            <a:ext cx="538825" cy="282208"/>
+          </a:xfrm>
+          <a:prstGeom prst="rect">
+            <a:avLst/>
+          </a:prstGeom>
+          <a:solidFill>
+            <a:schemeClr val="bg1">
+              <a:lumMod val="95000"/>
+            </a:schemeClr>
+          </a:solidFill>
+          <a:ln>
+            <a:solidFill>
+              <a:schemeClr val="bg1"/>
+            </a:solidFill>
+          </a:ln>
+        </p:spPr>
+        <p:style>
+          <a:lnRef idx="1">
+            <a:schemeClr val="accent1"/>
+          </a:lnRef>
+          <a:fillRef idx="3">
+            <a:schemeClr val="accent1"/>
+          </a:fillRef>
+          <a:effectRef idx="2">
+            <a:schemeClr val="accent1"/>
+          </a:effectRef>
+          <a:fontRef idx="minor">
+            <a:schemeClr val="lt1"/>
+          </a:fontRef>
+        </p:style>
+        <p:txBody>
+          <a:bodyPr rtlCol="0" anchor="ctr"/>
+          <a:lstStyle/>
+          <a:p>
+            <a:pPr algn="ctr"/>
+            <a:endParaRPr lang="en-US"/>
+          </a:p>
+        </p:txBody>
+      </p:sp>
+      <p:sp>
+        <p:nvSpPr>
+          <p:cNvPr id="15" name="Rectangle 14"/>
+          <p:cNvSpPr/>
+          <p:nvPr/>
+        </p:nvSpPr>
+        <p:spPr>
+          <a:xfrm>
+            <a:off x="1768877" y="4297273"/>
+            <a:ext cx="2208170" cy="255021"/>
+          </a:xfrm>
+          <a:prstGeom prst="rect">
+            <a:avLst/>
+          </a:prstGeom>
+          <a:solidFill>
+            <a:schemeClr val="bg1">
+              <a:lumMod val="95000"/>
+            </a:schemeClr>
+          </a:solidFill>
+          <a:ln>
+            <a:solidFill>
+              <a:schemeClr val="bg1"/>
+            </a:solidFill>
+          </a:ln>
+        </p:spPr>
+        <p:style>
+          <a:lnRef idx="1">
+            <a:schemeClr val="accent1"/>
+          </a:lnRef>
+          <a:fillRef idx="3">
+            <a:schemeClr val="accent1"/>
+          </a:fillRef>
+          <a:effectRef idx="2">
+            <a:schemeClr val="accent1"/>
+          </a:effectRef>
+          <a:fontRef idx="minor">
+            <a:schemeClr val="lt1"/>
+          </a:fontRef>
+        </p:style>
+        <p:txBody>
+          <a:bodyPr rtlCol="0" anchor="ctr"/>
+          <a:lstStyle/>
+          <a:p>
+            <a:pPr algn="ctr"/>
+            <a:endParaRPr lang="en-US"/>
+          </a:p>
+        </p:txBody>
+      </p:sp>
+      <p:sp>
+        <p:nvSpPr>
+          <p:cNvPr id="16" name="Rectangle 15"/>
+          <p:cNvSpPr/>
+          <p:nvPr/>
+        </p:nvSpPr>
+        <p:spPr>
+          <a:xfrm>
+            <a:off x="3973946" y="3192561"/>
+            <a:ext cx="2208170" cy="255021"/>
+          </a:xfrm>
+          <a:prstGeom prst="rect">
+            <a:avLst/>
+          </a:prstGeom>
+          <a:solidFill>
+            <a:schemeClr val="bg1">
+              <a:lumMod val="95000"/>
+            </a:schemeClr>
+          </a:solidFill>
+          <a:ln>
+            <a:solidFill>
+              <a:schemeClr val="bg1"/>
+            </a:solidFill>
+          </a:ln>
+        </p:spPr>
+        <p:style>
+          <a:lnRef idx="1">
+            <a:schemeClr val="accent1"/>
+          </a:lnRef>
+          <a:fillRef idx="3">
+            <a:schemeClr val="accent1"/>
+          </a:fillRef>
+          <a:effectRef idx="2">
+            <a:schemeClr val="accent1"/>
+          </a:effectRef>
+          <a:fontRef idx="minor">
+            <a:schemeClr val="lt1"/>
+          </a:fontRef>
+        </p:style>
+        <p:txBody>
+          <a:bodyPr rtlCol="0" anchor="ctr"/>
+          <a:lstStyle/>
+          <a:p>
+            <a:pPr algn="ctr"/>
+            <a:endParaRPr lang="en-US"/>
+          </a:p>
+        </p:txBody>
+      </p:sp>
+      <p:sp>
+        <p:nvSpPr>
+          <p:cNvPr id="17" name="Rectangle 16"/>
+          <p:cNvSpPr/>
+          <p:nvPr/>
+        </p:nvSpPr>
+        <p:spPr>
+          <a:xfrm>
+            <a:off x="6270372" y="4297273"/>
+            <a:ext cx="1645234" cy="279143"/>
+          </a:xfrm>
+          <a:prstGeom prst="rect">
+            <a:avLst/>
+          </a:prstGeom>
+          <a:solidFill>
+            <a:schemeClr val="bg1">
+              <a:lumMod val="95000"/>
+            </a:schemeClr>
+          </a:solidFill>
+          <a:ln>
+            <a:solidFill>
+              <a:schemeClr val="bg1"/>
+            </a:solidFill>
+          </a:ln>
+        </p:spPr>
+        <p:style>
+          <a:lnRef idx="1">
+            <a:schemeClr val="accent1"/>
+          </a:lnRef>
+          <a:fillRef idx="3">
+            <a:schemeClr val="accent1"/>
+          </a:fillRef>
+          <a:effectRef idx="2">
+            <a:schemeClr val="accent1"/>
+          </a:effectRef>
+          <a:fontRef idx="minor">
+            <a:schemeClr val="lt1"/>
+          </a:fontRef>
+        </p:style>
+        <p:txBody>
+          <a:bodyPr rtlCol="0" anchor="ctr"/>
+          <a:lstStyle/>
+          <a:p>
+            <a:pPr algn="ctr"/>
+            <a:endParaRPr lang="en-US"/>
+          </a:p>
+        </p:txBody>
+      </p:sp>
+      <p:sp>
+        <p:nvSpPr>
+          <p:cNvPr id="18" name="Rectangle 17"/>
+          <p:cNvSpPr/>
+          <p:nvPr/>
+        </p:nvSpPr>
+        <p:spPr>
+          <a:xfrm>
+            <a:off x="7912507" y="4858627"/>
+            <a:ext cx="538825" cy="282208"/>
+          </a:xfrm>
+          <a:prstGeom prst="rect">
+            <a:avLst/>
+          </a:prstGeom>
+          <a:solidFill>
+            <a:schemeClr val="bg1">
+              <a:lumMod val="95000"/>
+            </a:schemeClr>
+          </a:solidFill>
+          <a:ln>
+            <a:solidFill>
+              <a:schemeClr val="bg1"/>
+            </a:solidFill>
+          </a:ln>
+        </p:spPr>
+        <p:style>
+          <a:lnRef idx="1">
+            <a:schemeClr val="accent1"/>
+          </a:lnRef>
+          <a:fillRef idx="3">
+            <a:schemeClr val="accent1"/>
+          </a:fillRef>
+          <a:effectRef idx="2">
+            <a:schemeClr val="accent1"/>
+          </a:effectRef>
+          <a:fontRef idx="minor">
+            <a:schemeClr val="lt1"/>
+          </a:fontRef>
+        </p:style>
+        <p:txBody>
+          <a:bodyPr rtlCol="0" anchor="ctr"/>
+          <a:lstStyle/>
+          <a:p>
+            <a:pPr algn="ctr"/>
+            <a:endParaRPr lang="en-US"/>
+          </a:p>
+        </p:txBody>
+      </p:sp>
+      <p:sp>
+        <p:nvSpPr>
+          <p:cNvPr id="19" name="Rectangle 18"/>
+          <p:cNvSpPr/>
+          <p:nvPr/>
+        </p:nvSpPr>
+        <p:spPr>
+          <a:xfrm>
+            <a:off x="8452883" y="4295741"/>
+            <a:ext cx="538825" cy="282208"/>
+          </a:xfrm>
+          <a:prstGeom prst="rect">
+            <a:avLst/>
+          </a:prstGeom>
+          <a:solidFill>
+            <a:schemeClr val="bg1">
+              <a:lumMod val="95000"/>
+            </a:schemeClr>
+          </a:solidFill>
+          <a:ln>
+            <a:solidFill>
+              <a:schemeClr val="bg1"/>
+            </a:solidFill>
+          </a:ln>
+        </p:spPr>
+        <p:style>
+          <a:lnRef idx="1">
+            <a:schemeClr val="accent1"/>
+          </a:lnRef>
+          <a:fillRef idx="3">
+            <a:schemeClr val="accent1"/>
+          </a:fillRef>
+          <a:effectRef idx="2">
+            <a:schemeClr val="accent1"/>
+          </a:effectRef>
+          <a:fontRef idx="minor">
+            <a:schemeClr val="lt1"/>
+          </a:fontRef>
+        </p:style>
+        <p:txBody>
+          <a:bodyPr rtlCol="0" anchor="ctr"/>
+          <a:lstStyle/>
+          <a:p>
+            <a:pPr algn="ctr"/>
+            <a:endParaRPr lang="en-US"/>
           </a:p>
         </p:txBody>
       </p:sp>

</xml_diff>

<commit_message>
adding a few images to presentation
</commit_message>
<xml_diff>
--- a/doc/Recorder Hero!.pptx
+++ b/doc/Recorder Hero!.pptx
@@ -5,20 +5,19 @@
     <p:sldMasterId id="2147483792" r:id="rId1"/>
   </p:sldMasterIdLst>
   <p:notesMasterIdLst>
-    <p:notesMasterId r:id="rId13"/>
+    <p:notesMasterId r:id="rId12"/>
   </p:notesMasterIdLst>
   <p:sldIdLst>
     <p:sldId id="256" r:id="rId2"/>
-    <p:sldId id="257" r:id="rId3"/>
-    <p:sldId id="258" r:id="rId4"/>
-    <p:sldId id="259" r:id="rId5"/>
-    <p:sldId id="260" r:id="rId6"/>
-    <p:sldId id="261" r:id="rId7"/>
-    <p:sldId id="262" r:id="rId8"/>
-    <p:sldId id="263" r:id="rId9"/>
-    <p:sldId id="264" r:id="rId10"/>
-    <p:sldId id="265" r:id="rId11"/>
-    <p:sldId id="266" r:id="rId12"/>
+    <p:sldId id="258" r:id="rId3"/>
+    <p:sldId id="257" r:id="rId4"/>
+    <p:sldId id="260" r:id="rId5"/>
+    <p:sldId id="262" r:id="rId6"/>
+    <p:sldId id="263" r:id="rId7"/>
+    <p:sldId id="264" r:id="rId8"/>
+    <p:sldId id="265" r:id="rId9"/>
+    <p:sldId id="259" r:id="rId10"/>
+    <p:sldId id="266" r:id="rId11"/>
   </p:sldIdLst>
   <p:sldSz cx="9144000" cy="6858000" type="screen4x3"/>
   <p:notesSz cx="6858000" cy="9144000"/>
@@ -202,7 +201,7 @@
           <a:p>
             <a:fld id="{397DFA39-70C4-4EBB-BCE0-970B3CBB8D37}" type="datetimeFigureOut">
               <a:rPr lang="en-US" smtClean="0"/>
-              <a:t>11/14/2012</a:t>
+              <a:t>11/14/12</a:t>
             </a:fld>
             <a:endParaRPr lang="en-US"/>
           </a:p>
@@ -535,7 +534,7 @@
           <a:p>
             <a:fld id="{FF2AF184-7F5F-4E4E-A117-5552BE763A24}" type="slidenum">
               <a:rPr lang="en-US" smtClean="0"/>
-              <a:t>2</a:t>
+              <a:t>3</a:t>
             </a:fld>
             <a:endParaRPr lang="en-US"/>
           </a:p>
@@ -735,7 +734,7 @@
           <a:p>
             <a:fld id="{25015B3F-09AE-4C75-8121-2572650268AD}" type="datetimeFigureOut">
               <a:rPr lang="en-US" smtClean="0"/>
-              <a:t>11/14/2012</a:t>
+              <a:t>11/14/12</a:t>
             </a:fld>
             <a:endParaRPr lang="en-US"/>
           </a:p>
@@ -905,7 +904,7 @@
           <a:p>
             <a:fld id="{25015B3F-09AE-4C75-8121-2572650268AD}" type="datetimeFigureOut">
               <a:rPr lang="en-US" smtClean="0"/>
-              <a:t>11/14/2012</a:t>
+              <a:t>11/14/12</a:t>
             </a:fld>
             <a:endParaRPr lang="en-US"/>
           </a:p>
@@ -1085,7 +1084,7 @@
           <a:p>
             <a:fld id="{25015B3F-09AE-4C75-8121-2572650268AD}" type="datetimeFigureOut">
               <a:rPr lang="en-US" smtClean="0"/>
-              <a:t>11/14/2012</a:t>
+              <a:t>11/14/12</a:t>
             </a:fld>
             <a:endParaRPr lang="en-US"/>
           </a:p>
@@ -1255,7 +1254,7 @@
           <a:p>
             <a:fld id="{25015B3F-09AE-4C75-8121-2572650268AD}" type="datetimeFigureOut">
               <a:rPr lang="en-US" smtClean="0"/>
-              <a:t>11/14/2012</a:t>
+              <a:t>11/14/12</a:t>
             </a:fld>
             <a:endParaRPr lang="en-US"/>
           </a:p>
@@ -1501,7 +1500,7 @@
           <a:p>
             <a:fld id="{25015B3F-09AE-4C75-8121-2572650268AD}" type="datetimeFigureOut">
               <a:rPr lang="en-US" smtClean="0"/>
-              <a:t>11/14/2012</a:t>
+              <a:t>11/14/12</a:t>
             </a:fld>
             <a:endParaRPr lang="en-US"/>
           </a:p>
@@ -1789,7 +1788,7 @@
           <a:p>
             <a:fld id="{25015B3F-09AE-4C75-8121-2572650268AD}" type="datetimeFigureOut">
               <a:rPr lang="en-US" smtClean="0"/>
-              <a:t>11/14/2012</a:t>
+              <a:t>11/14/12</a:t>
             </a:fld>
             <a:endParaRPr lang="en-US"/>
           </a:p>
@@ -2211,7 +2210,7 @@
           <a:p>
             <a:fld id="{25015B3F-09AE-4C75-8121-2572650268AD}" type="datetimeFigureOut">
               <a:rPr lang="en-US" smtClean="0"/>
-              <a:t>11/14/2012</a:t>
+              <a:t>11/14/12</a:t>
             </a:fld>
             <a:endParaRPr lang="en-US"/>
           </a:p>
@@ -2329,7 +2328,7 @@
           <a:p>
             <a:fld id="{25015B3F-09AE-4C75-8121-2572650268AD}" type="datetimeFigureOut">
               <a:rPr lang="en-US" smtClean="0"/>
-              <a:t>11/14/2012</a:t>
+              <a:t>11/14/12</a:t>
             </a:fld>
             <a:endParaRPr lang="en-US"/>
           </a:p>
@@ -2424,7 +2423,7 @@
           <a:p>
             <a:fld id="{25015B3F-09AE-4C75-8121-2572650268AD}" type="datetimeFigureOut">
               <a:rPr lang="en-US" smtClean="0"/>
-              <a:t>11/14/2012</a:t>
+              <a:t>11/14/12</a:t>
             </a:fld>
             <a:endParaRPr lang="en-US"/>
           </a:p>
@@ -2701,7 +2700,7 @@
           <a:p>
             <a:fld id="{25015B3F-09AE-4C75-8121-2572650268AD}" type="datetimeFigureOut">
               <a:rPr lang="en-US" smtClean="0"/>
-              <a:t>11/14/2012</a:t>
+              <a:t>11/14/12</a:t>
             </a:fld>
             <a:endParaRPr lang="en-US"/>
           </a:p>
@@ -2954,7 +2953,7 @@
           <a:p>
             <a:fld id="{25015B3F-09AE-4C75-8121-2572650268AD}" type="datetimeFigureOut">
               <a:rPr lang="en-US" smtClean="0"/>
-              <a:t>11/14/2012</a:t>
+              <a:t>11/14/12</a:t>
             </a:fld>
             <a:endParaRPr lang="en-US"/>
           </a:p>
@@ -3167,7 +3166,7 @@
           <a:p>
             <a:fld id="{25015B3F-09AE-4C75-8121-2572650268AD}" type="datetimeFigureOut">
               <a:rPr lang="en-US" smtClean="0"/>
-              <a:t>11/14/2012</a:t>
+              <a:t>11/14/12</a:t>
             </a:fld>
             <a:endParaRPr lang="en-US"/>
           </a:p>
@@ -3617,7 +3616,7 @@
   <p:timing>
     <p:tnLst>
       <p:par>
-        <p:cTn id="1" dur="indefinite" restart="never" nodeType="tmRoot"/>
+        <p:cTn xmlns:p14="http://schemas.microsoft.com/office/powerpoint/2010/main" id="1" dur="indefinite" restart="never" nodeType="tmRoot"/>
       </p:par>
     </p:tnLst>
   </p:timing>
@@ -3625,95 +3624,6 @@
 </file>
 
 <file path=ppt/slides/slide10.xml><?xml version="1.0" encoding="utf-8"?>
-<p:sld xmlns:a="http://schemas.openxmlformats.org/drawingml/2006/main" xmlns:r="http://schemas.openxmlformats.org/officeDocument/2006/relationships" xmlns:p="http://schemas.openxmlformats.org/presentationml/2006/main">
-  <p:cSld>
-    <p:spTree>
-      <p:nvGrpSpPr>
-        <p:cNvPr id="1" name=""/>
-        <p:cNvGrpSpPr/>
-        <p:nvPr/>
-      </p:nvGrpSpPr>
-      <p:grpSpPr>
-        <a:xfrm>
-          <a:off x="0" y="0"/>
-          <a:ext cx="0" cy="0"/>
-          <a:chOff x="0" y="0"/>
-          <a:chExt cx="0" cy="0"/>
-        </a:xfrm>
-      </p:grpSpPr>
-      <p:sp>
-        <p:nvSpPr>
-          <p:cNvPr id="2" name="Title 1"/>
-          <p:cNvSpPr>
-            <a:spLocks noGrp="1"/>
-          </p:cNvSpPr>
-          <p:nvPr>
-            <p:ph type="title"/>
-          </p:nvPr>
-        </p:nvSpPr>
-        <p:spPr/>
-        <p:txBody>
-          <a:bodyPr/>
-          <a:lstStyle/>
-          <a:p>
-            <a:r>
-              <a:rPr lang="en-US" dirty="0" smtClean="0"/>
-              <a:t>Display</a:t>
-            </a:r>
-            <a:endParaRPr lang="en-US" dirty="0"/>
-          </a:p>
-        </p:txBody>
-      </p:sp>
-      <p:pic>
-        <p:nvPicPr>
-          <p:cNvPr id="4" name="Content Placeholder 3"/>
-          <p:cNvPicPr>
-            <a:picLocks noGrp="1" noChangeAspect="1"/>
-          </p:cNvPicPr>
-          <p:nvPr>
-            <p:ph idx="1"/>
-          </p:nvPr>
-        </p:nvPicPr>
-        <p:blipFill>
-          <a:blip r:embed="rId2">
-            <a:extLst>
-              <a:ext uri="{28A0092B-C50C-407E-A947-70E740481C1C}">
-                <a14:useLocalDpi xmlns:a14="http://schemas.microsoft.com/office/drawing/2010/main" val="0"/>
-              </a:ext>
-            </a:extLst>
-          </a:blip>
-          <a:stretch>
-            <a:fillRect/>
-          </a:stretch>
-        </p:blipFill>
-        <p:spPr>
-          <a:xfrm>
-            <a:off x="990600" y="1981200"/>
-            <a:ext cx="7763756" cy="3505200"/>
-          </a:xfrm>
-        </p:spPr>
-      </p:pic>
-    </p:spTree>
-    <p:extLst>
-      <p:ext uri="{BB962C8B-B14F-4D97-AF65-F5344CB8AC3E}">
-        <p14:creationId xmlns:p14="http://schemas.microsoft.com/office/powerpoint/2010/main" val="4017615296"/>
-      </p:ext>
-    </p:extLst>
-  </p:cSld>
-  <p:clrMapOvr>
-    <a:masterClrMapping/>
-  </p:clrMapOvr>
-  <p:timing>
-    <p:tnLst>
-      <p:par>
-        <p:cTn id="1" dur="indefinite" restart="never" nodeType="tmRoot"/>
-      </p:par>
-    </p:tnLst>
-  </p:timing>
-</p:sld>
-</file>
-
-<file path=ppt/slides/slide11.xml><?xml version="1.0" encoding="utf-8"?>
 <p:sld xmlns:a="http://schemas.openxmlformats.org/drawingml/2006/main" xmlns:r="http://schemas.openxmlformats.org/officeDocument/2006/relationships" xmlns:p="http://schemas.openxmlformats.org/presentationml/2006/main">
   <p:cSld>
     <p:spTree>
@@ -4025,7 +3935,7 @@
   <p:timing>
     <p:tnLst>
       <p:par>
-        <p:cTn id="1" dur="indefinite" restart="never" nodeType="tmRoot"/>
+        <p:cTn xmlns:p14="http://schemas.microsoft.com/office/powerpoint/2010/main" id="1" dur="indefinite" restart="never" nodeType="tmRoot"/>
       </p:par>
     </p:tnLst>
   </p:timing>
@@ -4033,154 +3943,6 @@
 </file>
 
 <file path=ppt/slides/slide2.xml><?xml version="1.0" encoding="utf-8"?>
-<p:sld xmlns:a="http://schemas.openxmlformats.org/drawingml/2006/main" xmlns:r="http://schemas.openxmlformats.org/officeDocument/2006/relationships" xmlns:p="http://schemas.openxmlformats.org/presentationml/2006/main">
-  <p:cSld>
-    <p:spTree>
-      <p:nvGrpSpPr>
-        <p:cNvPr id="1" name=""/>
-        <p:cNvGrpSpPr/>
-        <p:nvPr/>
-      </p:nvGrpSpPr>
-      <p:grpSpPr>
-        <a:xfrm>
-          <a:off x="0" y="0"/>
-          <a:ext cx="0" cy="0"/>
-          <a:chOff x="0" y="0"/>
-          <a:chExt cx="0" cy="0"/>
-        </a:xfrm>
-      </p:grpSpPr>
-      <p:sp>
-        <p:nvSpPr>
-          <p:cNvPr id="2" name="Rectangle 1"/>
-          <p:cNvSpPr/>
-          <p:nvPr/>
-        </p:nvSpPr>
-        <p:spPr>
-          <a:xfrm>
-            <a:off x="4572000" y="3657600"/>
-            <a:ext cx="1905000" cy="609600"/>
-          </a:xfrm>
-          <a:prstGeom prst="rect">
-            <a:avLst/>
-          </a:prstGeom>
-          <a:solidFill>
-            <a:schemeClr val="bg1"/>
-          </a:solidFill>
-          <a:ln>
-            <a:solidFill>
-              <a:schemeClr val="bg1"/>
-            </a:solidFill>
-          </a:ln>
-        </p:spPr>
-        <p:style>
-          <a:lnRef idx="2">
-            <a:schemeClr val="accent1">
-              <a:shade val="50000"/>
-            </a:schemeClr>
-          </a:lnRef>
-          <a:fillRef idx="1">
-            <a:schemeClr val="accent1"/>
-          </a:fillRef>
-          <a:effectRef idx="0">
-            <a:schemeClr val="accent1"/>
-          </a:effectRef>
-          <a:fontRef idx="minor">
-            <a:schemeClr val="lt1"/>
-          </a:fontRef>
-        </p:style>
-        <p:txBody>
-          <a:bodyPr rtlCol="0" anchor="ctr"/>
-          <a:lstStyle/>
-          <a:p>
-            <a:pPr algn="ctr"/>
-            <a:endParaRPr lang="en-US"/>
-          </a:p>
-        </p:txBody>
-      </p:sp>
-      <p:pic>
-        <p:nvPicPr>
-          <p:cNvPr id="3" name="Picture 2"/>
-          <p:cNvPicPr>
-            <a:picLocks noChangeAspect="1"/>
-          </p:cNvPicPr>
-          <p:nvPr/>
-        </p:nvPicPr>
-        <p:blipFill>
-          <a:blip r:embed="rId3">
-            <a:extLst>
-              <a:ext uri="{28A0092B-C50C-407E-A947-70E740481C1C}">
-                <a14:useLocalDpi xmlns:a14="http://schemas.microsoft.com/office/drawing/2010/main" val="0"/>
-              </a:ext>
-            </a:extLst>
-          </a:blip>
-          <a:stretch>
-            <a:fillRect/>
-          </a:stretch>
-        </p:blipFill>
-        <p:spPr>
-          <a:xfrm>
-            <a:off x="-51303" y="0"/>
-            <a:ext cx="9144000" cy="6858000"/>
-          </a:xfrm>
-          <a:prstGeom prst="rect">
-            <a:avLst/>
-          </a:prstGeom>
-        </p:spPr>
-      </p:pic>
-      <p:sp>
-        <p:nvSpPr>
-          <p:cNvPr id="4" name="TextBox 3"/>
-          <p:cNvSpPr txBox="1"/>
-          <p:nvPr/>
-        </p:nvSpPr>
-        <p:spPr>
-          <a:xfrm>
-            <a:off x="2057400" y="6373763"/>
-            <a:ext cx="3048000" cy="461665"/>
-          </a:xfrm>
-          <a:prstGeom prst="rect">
-            <a:avLst/>
-          </a:prstGeom>
-          <a:noFill/>
-        </p:spPr>
-        <p:txBody>
-          <a:bodyPr wrap="square" rtlCol="0">
-            <a:spAutoFit/>
-          </a:bodyPr>
-          <a:lstStyle/>
-          <a:p>
-            <a:r>
-              <a:rPr lang="en-US" sz="1200" dirty="0" smtClean="0"/>
-              <a:t>Source: http</a:t>
-            </a:r>
-            <a:r>
-              <a:rPr lang="en-US" sz="1200" dirty="0"/>
-              <a:t>://www.vgcats.com/comics/?strip_id=230</a:t>
-            </a:r>
-          </a:p>
-        </p:txBody>
-      </p:sp>
-    </p:spTree>
-    <p:extLst>
-      <p:ext uri="{BB962C8B-B14F-4D97-AF65-F5344CB8AC3E}">
-        <p14:creationId xmlns:p14="http://schemas.microsoft.com/office/powerpoint/2010/main" val="4211142190"/>
-      </p:ext>
-    </p:extLst>
-  </p:cSld>
-  <p:clrMapOvr>
-    <a:masterClrMapping/>
-  </p:clrMapOvr>
-  <p:timing>
-    <p:tnLst>
-      <p:par>
-        <p:cTn id="1" dur="indefinite" restart="never" nodeType="tmRoot"/>
-      </p:par>
-    </p:tnLst>
-  </p:timing>
-</p:sld>
-</file>
-
-<file path=ppt/slides/slide3.xml><?xml version="1.0" encoding="utf-8"?>
 <p:sld xmlns:a="http://schemas.openxmlformats.org/drawingml/2006/main" xmlns:r="http://schemas.openxmlformats.org/officeDocument/2006/relationships" xmlns:p="http://schemas.openxmlformats.org/presentationml/2006/main">
   <p:cSld>
     <p:spTree>
@@ -4239,7 +4001,7 @@
             </a:outerShdw>
           </a:effectLst>
           <a:extLst>
-            <a:ext uri="{909E8E84-426E-40DD-AFC4-6F175D3DCCD1}">
+            <a:ext uri="{909E8E84-426E-40dd-AFC4-6F175D3DCCD1}">
               <a14:hiddenFill xmlns:a14="http://schemas.microsoft.com/office/drawing/2010/main">
                 <a:solidFill>
                   <a:srgbClr val="FFFFFF"/>
@@ -4279,11 +4041,7 @@
           <a:p>
             <a:r>
               <a:rPr lang="en-US" sz="1200" dirty="0" smtClean="0"/>
-              <a:t>http</a:t>
-            </a:r>
-            <a:r>
-              <a:rPr lang="en-US" sz="1200" dirty="0" smtClean="0"/>
-              <a:t>://www.hightech-edge.com/guitar-hero-3-legends-of-rock-xbox-games/1468/</a:t>
+              <a:t>http://www.hightech-edge.com/guitar-hero-3-legends-of-rock-xbox-games/1468/</a:t>
             </a:r>
             <a:endParaRPr lang="en-US" sz="1200" dirty="0"/>
           </a:p>
@@ -4302,7 +4060,155 @@
   <p:timing>
     <p:tnLst>
       <p:par>
-        <p:cTn id="1" dur="indefinite" restart="never" nodeType="tmRoot"/>
+        <p:cTn xmlns:p14="http://schemas.microsoft.com/office/powerpoint/2010/main" id="1" dur="indefinite" restart="never" nodeType="tmRoot"/>
+      </p:par>
+    </p:tnLst>
+  </p:timing>
+</p:sld>
+</file>
+
+<file path=ppt/slides/slide3.xml><?xml version="1.0" encoding="utf-8"?>
+<p:sld xmlns:a="http://schemas.openxmlformats.org/drawingml/2006/main" xmlns:r="http://schemas.openxmlformats.org/officeDocument/2006/relationships" xmlns:p="http://schemas.openxmlformats.org/presentationml/2006/main">
+  <p:cSld>
+    <p:spTree>
+      <p:nvGrpSpPr>
+        <p:cNvPr id="1" name=""/>
+        <p:cNvGrpSpPr/>
+        <p:nvPr/>
+      </p:nvGrpSpPr>
+      <p:grpSpPr>
+        <a:xfrm>
+          <a:off x="0" y="0"/>
+          <a:ext cx="0" cy="0"/>
+          <a:chOff x="0" y="0"/>
+          <a:chExt cx="0" cy="0"/>
+        </a:xfrm>
+      </p:grpSpPr>
+      <p:sp>
+        <p:nvSpPr>
+          <p:cNvPr id="2" name="Rectangle 1"/>
+          <p:cNvSpPr/>
+          <p:nvPr/>
+        </p:nvSpPr>
+        <p:spPr>
+          <a:xfrm>
+            <a:off x="4572000" y="3657600"/>
+            <a:ext cx="1905000" cy="609600"/>
+          </a:xfrm>
+          <a:prstGeom prst="rect">
+            <a:avLst/>
+          </a:prstGeom>
+          <a:solidFill>
+            <a:schemeClr val="bg1"/>
+          </a:solidFill>
+          <a:ln>
+            <a:solidFill>
+              <a:schemeClr val="bg1"/>
+            </a:solidFill>
+          </a:ln>
+        </p:spPr>
+        <p:style>
+          <a:lnRef idx="2">
+            <a:schemeClr val="accent1">
+              <a:shade val="50000"/>
+            </a:schemeClr>
+          </a:lnRef>
+          <a:fillRef idx="1">
+            <a:schemeClr val="accent1"/>
+          </a:fillRef>
+          <a:effectRef idx="0">
+            <a:schemeClr val="accent1"/>
+          </a:effectRef>
+          <a:fontRef idx="minor">
+            <a:schemeClr val="lt1"/>
+          </a:fontRef>
+        </p:style>
+        <p:txBody>
+          <a:bodyPr rtlCol="0" anchor="ctr"/>
+          <a:lstStyle/>
+          <a:p>
+            <a:pPr algn="ctr"/>
+            <a:endParaRPr lang="en-US"/>
+          </a:p>
+        </p:txBody>
+      </p:sp>
+      <p:pic>
+        <p:nvPicPr>
+          <p:cNvPr id="3" name="Picture 2"/>
+          <p:cNvPicPr>
+            <a:picLocks noChangeAspect="1"/>
+          </p:cNvPicPr>
+          <p:nvPr/>
+        </p:nvPicPr>
+        <p:blipFill>
+          <a:blip r:embed="rId3">
+            <a:extLst>
+              <a:ext uri="{28A0092B-C50C-407E-A947-70E740481C1C}">
+                <a14:useLocalDpi xmlns:a14="http://schemas.microsoft.com/office/drawing/2010/main" val="0"/>
+              </a:ext>
+            </a:extLst>
+          </a:blip>
+          <a:stretch>
+            <a:fillRect/>
+          </a:stretch>
+        </p:blipFill>
+        <p:spPr>
+          <a:xfrm>
+            <a:off x="-51303" y="0"/>
+            <a:ext cx="9144000" cy="6858000"/>
+          </a:xfrm>
+          <a:prstGeom prst="rect">
+            <a:avLst/>
+          </a:prstGeom>
+        </p:spPr>
+      </p:pic>
+      <p:sp>
+        <p:nvSpPr>
+          <p:cNvPr id="4" name="TextBox 3"/>
+          <p:cNvSpPr txBox="1"/>
+          <p:nvPr/>
+        </p:nvSpPr>
+        <p:spPr>
+          <a:xfrm>
+            <a:off x="2057400" y="6373763"/>
+            <a:ext cx="3048000" cy="461665"/>
+          </a:xfrm>
+          <a:prstGeom prst="rect">
+            <a:avLst/>
+          </a:prstGeom>
+          <a:noFill/>
+        </p:spPr>
+        <p:txBody>
+          <a:bodyPr wrap="square" rtlCol="0">
+            <a:spAutoFit/>
+          </a:bodyPr>
+          <a:lstStyle/>
+          <a:p>
+            <a:r>
+              <a:rPr lang="en-US" sz="1200" dirty="0" smtClean="0"/>
+              <a:t>Source: http</a:t>
+            </a:r>
+            <a:r>
+              <a:rPr lang="en-US" sz="1200" dirty="0"/>
+              <a:t>://www.vgcats.com/comics/?strip_id=230</a:t>
+            </a:r>
+          </a:p>
+        </p:txBody>
+      </p:sp>
+    </p:spTree>
+    <p:extLst>
+      <p:ext uri="{BB962C8B-B14F-4D97-AF65-F5344CB8AC3E}">
+        <p14:creationId xmlns:p14="http://schemas.microsoft.com/office/powerpoint/2010/main" val="4211142190"/>
+      </p:ext>
+    </p:extLst>
+  </p:cSld>
+  <p:clrMapOvr>
+    <a:masterClrMapping/>
+  </p:clrMapOvr>
+  <p:timing>
+    <p:tnLst>
+      <p:par>
+        <p:cTn xmlns:p14="http://schemas.microsoft.com/office/powerpoint/2010/main" id="1" dur="indefinite" restart="never" nodeType="tmRoot"/>
       </p:par>
     </p:tnLst>
   </p:timing>
@@ -4310,6 +4216,757 @@
 </file>
 
 <file path=ppt/slides/slide4.xml><?xml version="1.0" encoding="utf-8"?>
+<p:sld xmlns:a="http://schemas.openxmlformats.org/drawingml/2006/main" xmlns:r="http://schemas.openxmlformats.org/officeDocument/2006/relationships" xmlns:p="http://schemas.openxmlformats.org/presentationml/2006/main">
+  <p:cSld>
+    <p:spTree>
+      <p:nvGrpSpPr>
+        <p:cNvPr id="1" name=""/>
+        <p:cNvGrpSpPr/>
+        <p:nvPr/>
+      </p:nvGrpSpPr>
+      <p:grpSpPr>
+        <a:xfrm>
+          <a:off x="0" y="0"/>
+          <a:ext cx="0" cy="0"/>
+          <a:chOff x="0" y="0"/>
+          <a:chExt cx="0" cy="0"/>
+        </a:xfrm>
+      </p:grpSpPr>
+      <p:pic>
+        <p:nvPicPr>
+          <p:cNvPr id="4" name="Content Placeholder 6"/>
+          <p:cNvPicPr>
+            <a:picLocks noChangeAspect="1"/>
+          </p:cNvPicPr>
+          <p:nvPr/>
+        </p:nvPicPr>
+        <p:blipFill>
+          <a:blip r:embed="rId2">
+            <a:extLst>
+              <a:ext uri="{28A0092B-C50C-407E-A947-70E740481C1C}">
+                <a14:useLocalDpi xmlns:a14="http://schemas.microsoft.com/office/drawing/2010/main" val="0"/>
+              </a:ext>
+            </a:extLst>
+          </a:blip>
+          <a:stretch>
+            <a:fillRect/>
+          </a:stretch>
+        </p:blipFill>
+        <p:spPr>
+          <a:xfrm>
+            <a:off x="685800" y="2971800"/>
+            <a:ext cx="7506595" cy="3733800"/>
+          </a:xfrm>
+          <a:prstGeom prst="rect">
+            <a:avLst/>
+          </a:prstGeom>
+        </p:spPr>
+      </p:pic>
+      <p:sp>
+        <p:nvSpPr>
+          <p:cNvPr id="2" name="Title 1"/>
+          <p:cNvSpPr>
+            <a:spLocks noGrp="1"/>
+          </p:cNvSpPr>
+          <p:nvPr>
+            <p:ph type="title"/>
+          </p:nvPr>
+        </p:nvSpPr>
+        <p:spPr/>
+        <p:txBody>
+          <a:bodyPr/>
+          <a:lstStyle/>
+          <a:p>
+            <a:r>
+              <a:rPr lang="en-US" dirty="0" smtClean="0"/>
+              <a:t>Technical Overview</a:t>
+            </a:r>
+            <a:endParaRPr lang="en-US" dirty="0"/>
+          </a:p>
+        </p:txBody>
+      </p:sp>
+      <p:sp>
+        <p:nvSpPr>
+          <p:cNvPr id="3" name="Content Placeholder 2"/>
+          <p:cNvSpPr>
+            <a:spLocks noGrp="1"/>
+          </p:cNvSpPr>
+          <p:nvPr>
+            <p:ph idx="1"/>
+          </p:nvPr>
+        </p:nvSpPr>
+        <p:spPr>
+          <a:xfrm>
+            <a:off x="457200" y="1295400"/>
+            <a:ext cx="8229600" cy="4525963"/>
+          </a:xfrm>
+        </p:spPr>
+        <p:txBody>
+          <a:bodyPr/>
+          <a:lstStyle/>
+          <a:p>
+            <a:r>
+              <a:rPr lang="en-US" dirty="0" smtClean="0"/>
+              <a:t>FFT</a:t>
+            </a:r>
+          </a:p>
+          <a:p>
+            <a:r>
+              <a:rPr lang="en-US" dirty="0" smtClean="0"/>
+              <a:t>Game State Machine</a:t>
+            </a:r>
+          </a:p>
+          <a:p>
+            <a:r>
+              <a:rPr lang="en-US" dirty="0" smtClean="0"/>
+              <a:t>Video</a:t>
+            </a:r>
+          </a:p>
+          <a:p>
+            <a:r>
+              <a:rPr lang="en-US" dirty="0" smtClean="0"/>
+              <a:t>Musical Score</a:t>
+            </a:r>
+            <a:endParaRPr lang="en-US" dirty="0"/>
+          </a:p>
+        </p:txBody>
+      </p:sp>
+    </p:spTree>
+    <p:extLst>
+      <p:ext uri="{BB962C8B-B14F-4D97-AF65-F5344CB8AC3E}">
+        <p14:creationId xmlns:p14="http://schemas.microsoft.com/office/powerpoint/2010/main" val="150717875"/>
+      </p:ext>
+    </p:extLst>
+  </p:cSld>
+  <p:clrMapOvr>
+    <a:masterClrMapping/>
+  </p:clrMapOvr>
+  <p:timing>
+    <p:tnLst>
+      <p:par>
+        <p:cTn xmlns:p14="http://schemas.microsoft.com/office/powerpoint/2010/main" id="1" dur="indefinite" restart="never" nodeType="tmRoot"/>
+      </p:par>
+    </p:tnLst>
+  </p:timing>
+</p:sld>
+</file>
+
+<file path=ppt/slides/slide5.xml><?xml version="1.0" encoding="utf-8"?>
+<p:sld xmlns:a="http://schemas.openxmlformats.org/drawingml/2006/main" xmlns:r="http://schemas.openxmlformats.org/officeDocument/2006/relationships" xmlns:p="http://schemas.openxmlformats.org/presentationml/2006/main">
+  <p:cSld>
+    <p:spTree>
+      <p:nvGrpSpPr>
+        <p:cNvPr id="1" name=""/>
+        <p:cNvGrpSpPr/>
+        <p:nvPr/>
+      </p:nvGrpSpPr>
+      <p:grpSpPr>
+        <a:xfrm>
+          <a:off x="0" y="0"/>
+          <a:ext cx="0" cy="0"/>
+          <a:chOff x="0" y="0"/>
+          <a:chExt cx="0" cy="0"/>
+        </a:xfrm>
+      </p:grpSpPr>
+      <p:pic>
+        <p:nvPicPr>
+          <p:cNvPr id="6" name="Content Placeholder 5"/>
+          <p:cNvPicPr>
+            <a:picLocks noGrp="1" noChangeAspect="1"/>
+          </p:cNvPicPr>
+          <p:nvPr>
+            <p:ph idx="1"/>
+          </p:nvPr>
+        </p:nvPicPr>
+        <p:blipFill>
+          <a:blip r:embed="rId2">
+            <a:extLst>
+              <a:ext uri="{28A0092B-C50C-407E-A947-70E740481C1C}">
+                <a14:useLocalDpi xmlns:a14="http://schemas.microsoft.com/office/drawing/2010/main" val="0"/>
+              </a:ext>
+            </a:extLst>
+          </a:blip>
+          <a:stretch>
+            <a:fillRect/>
+          </a:stretch>
+        </p:blipFill>
+        <p:spPr>
+          <a:xfrm>
+            <a:off x="1219200" y="838200"/>
+            <a:ext cx="6815193" cy="3581400"/>
+          </a:xfrm>
+        </p:spPr>
+      </p:pic>
+      <p:sp>
+        <p:nvSpPr>
+          <p:cNvPr id="2" name="Title 1"/>
+          <p:cNvSpPr>
+            <a:spLocks noGrp="1"/>
+          </p:cNvSpPr>
+          <p:nvPr>
+            <p:ph type="title"/>
+          </p:nvPr>
+        </p:nvSpPr>
+        <p:spPr/>
+        <p:txBody>
+          <a:bodyPr/>
+          <a:lstStyle/>
+          <a:p>
+            <a:r>
+              <a:rPr lang="en-US" dirty="0" smtClean="0"/>
+              <a:t>Note Identification</a:t>
+            </a:r>
+            <a:endParaRPr lang="en-US" dirty="0"/>
+          </a:p>
+        </p:txBody>
+      </p:sp>
+      <p:pic>
+        <p:nvPicPr>
+          <p:cNvPr id="3" name="Picture 2" descr="waveform_eggs.gif"/>
+          <p:cNvPicPr>
+            <a:picLocks noChangeAspect="1"/>
+          </p:cNvPicPr>
+          <p:nvPr/>
+        </p:nvPicPr>
+        <p:blipFill rotWithShape="1">
+          <a:blip r:embed="rId3">
+            <a:extLst>
+              <a:ext uri="{28A0092B-C50C-407E-A947-70E740481C1C}">
+                <a14:useLocalDpi xmlns:a14="http://schemas.microsoft.com/office/drawing/2010/main" val="0"/>
+              </a:ext>
+            </a:extLst>
+          </a:blip>
+          <a:srcRect l="-15626" t="-73548" r="-65626" b="46521"/>
+          <a:stretch/>
+        </p:blipFill>
+        <p:spPr>
+          <a:xfrm>
+            <a:off x="152400" y="2514600"/>
+            <a:ext cx="5303520" cy="3867912"/>
+          </a:xfrm>
+          <a:prstGeom prst="rect">
+            <a:avLst/>
+          </a:prstGeom>
+        </p:spPr>
+      </p:pic>
+      <p:cxnSp>
+        <p:nvCxnSpPr>
+          <p:cNvPr id="5" name="Straight Arrow Connector 4"/>
+          <p:cNvCxnSpPr/>
+          <p:nvPr/>
+        </p:nvCxnSpPr>
+        <p:spPr>
+          <a:xfrm>
+            <a:off x="3886200" y="5486400"/>
+            <a:ext cx="1295400" cy="0"/>
+          </a:xfrm>
+          <a:prstGeom prst="straightConnector1">
+            <a:avLst/>
+          </a:prstGeom>
+          <a:ln>
+            <a:solidFill>
+              <a:srgbClr val="000000"/>
+            </a:solidFill>
+            <a:tailEnd type="arrow"/>
+          </a:ln>
+        </p:spPr>
+        <p:style>
+          <a:lnRef idx="2">
+            <a:schemeClr val="accent1"/>
+          </a:lnRef>
+          <a:fillRef idx="0">
+            <a:schemeClr val="accent1"/>
+          </a:fillRef>
+          <a:effectRef idx="1">
+            <a:schemeClr val="accent1"/>
+          </a:effectRef>
+          <a:fontRef idx="minor">
+            <a:schemeClr val="tx1"/>
+          </a:fontRef>
+        </p:style>
+      </p:cxnSp>
+      <p:sp>
+        <p:nvSpPr>
+          <p:cNvPr id="7" name="TextBox 6"/>
+          <p:cNvSpPr txBox="1"/>
+          <p:nvPr/>
+        </p:nvSpPr>
+        <p:spPr>
+          <a:xfrm>
+            <a:off x="5410200" y="5181600"/>
+            <a:ext cx="3429000" cy="523220"/>
+          </a:xfrm>
+          <a:prstGeom prst="rect">
+            <a:avLst/>
+          </a:prstGeom>
+          <a:noFill/>
+        </p:spPr>
+        <p:txBody>
+          <a:bodyPr wrap="square" rtlCol="0">
+            <a:spAutoFit/>
+          </a:bodyPr>
+          <a:lstStyle/>
+          <a:p>
+            <a:r>
+              <a:rPr lang="en-US" sz="2800" dirty="0" smtClean="0"/>
+              <a:t>{ A, B, C, D, E, F, G }</a:t>
+            </a:r>
+            <a:endParaRPr lang="en-US" sz="2800" dirty="0"/>
+          </a:p>
+        </p:txBody>
+      </p:sp>
+      <p:sp>
+        <p:nvSpPr>
+          <p:cNvPr id="8" name="TextBox 7"/>
+          <p:cNvSpPr txBox="1"/>
+          <p:nvPr/>
+        </p:nvSpPr>
+        <p:spPr>
+          <a:xfrm>
+            <a:off x="228600" y="6519446"/>
+            <a:ext cx="7239000" cy="338554"/>
+          </a:xfrm>
+          <a:prstGeom prst="rect">
+            <a:avLst/>
+          </a:prstGeom>
+          <a:noFill/>
+        </p:spPr>
+        <p:txBody>
+          <a:bodyPr wrap="square" rtlCol="0">
+            <a:spAutoFit/>
+          </a:bodyPr>
+          <a:lstStyle/>
+          <a:p>
+            <a:r>
+              <a:rPr lang="en-US" sz="1600" dirty="0"/>
+              <a:t>Source: http://</a:t>
+            </a:r>
+            <a:r>
+              <a:rPr lang="en-US" sz="1600" dirty="0" err="1"/>
+              <a:t>www.marinbezhanov.com</a:t>
+            </a:r>
+            <a:r>
+              <a:rPr lang="en-US" sz="1600" dirty="0"/>
+              <a:t>/</a:t>
+            </a:r>
+            <a:r>
+              <a:rPr lang="en-US" sz="1600" dirty="0" err="1"/>
+              <a:t>img</a:t>
+            </a:r>
+            <a:r>
+              <a:rPr lang="en-US" sz="1600" dirty="0"/>
+              <a:t>/</a:t>
+            </a:r>
+            <a:r>
+              <a:rPr lang="en-US" sz="1600" dirty="0" err="1"/>
+              <a:t>waveform_eggs.gif</a:t>
+            </a:r>
+            <a:r>
+              <a:rPr lang="en-US" sz="1600" dirty="0"/>
+              <a:t> </a:t>
+            </a:r>
+          </a:p>
+        </p:txBody>
+      </p:sp>
+    </p:spTree>
+    <p:extLst>
+      <p:ext uri="{BB962C8B-B14F-4D97-AF65-F5344CB8AC3E}">
+        <p14:creationId xmlns:p14="http://schemas.microsoft.com/office/powerpoint/2010/main" val="2836285147"/>
+      </p:ext>
+    </p:extLst>
+  </p:cSld>
+  <p:clrMapOvr>
+    <a:masterClrMapping/>
+  </p:clrMapOvr>
+  <p:timing>
+    <p:tnLst>
+      <p:par>
+        <p:cTn xmlns:p14="http://schemas.microsoft.com/office/powerpoint/2010/main" id="1" dur="indefinite" restart="never" nodeType="tmRoot"/>
+      </p:par>
+    </p:tnLst>
+  </p:timing>
+</p:sld>
+</file>
+
+<file path=ppt/slides/slide6.xml><?xml version="1.0" encoding="utf-8"?>
+<p:sld xmlns:a="http://schemas.openxmlformats.org/drawingml/2006/main" xmlns:r="http://schemas.openxmlformats.org/officeDocument/2006/relationships" xmlns:p="http://schemas.openxmlformats.org/presentationml/2006/main">
+  <p:cSld>
+    <p:spTree>
+      <p:nvGrpSpPr>
+        <p:cNvPr id="1" name=""/>
+        <p:cNvGrpSpPr/>
+        <p:nvPr/>
+      </p:nvGrpSpPr>
+      <p:grpSpPr>
+        <a:xfrm>
+          <a:off x="0" y="0"/>
+          <a:ext cx="0" cy="0"/>
+          <a:chOff x="0" y="0"/>
+          <a:chExt cx="0" cy="0"/>
+        </a:xfrm>
+      </p:grpSpPr>
+      <p:pic>
+        <p:nvPicPr>
+          <p:cNvPr id="4" name="Content Placeholder 3"/>
+          <p:cNvPicPr>
+            <a:picLocks noGrp="1" noChangeAspect="1"/>
+          </p:cNvPicPr>
+          <p:nvPr>
+            <p:ph idx="1"/>
+          </p:nvPr>
+        </p:nvPicPr>
+        <p:blipFill>
+          <a:blip r:embed="rId2">
+            <a:extLst>
+              <a:ext uri="{28A0092B-C50C-407E-A947-70E740481C1C}">
+                <a14:useLocalDpi xmlns:a14="http://schemas.microsoft.com/office/drawing/2010/main" val="0"/>
+              </a:ext>
+            </a:extLst>
+          </a:blip>
+          <a:stretch>
+            <a:fillRect/>
+          </a:stretch>
+        </p:blipFill>
+        <p:spPr>
+          <a:xfrm>
+            <a:off x="1143000" y="838200"/>
+            <a:ext cx="6781800" cy="5137655"/>
+          </a:xfrm>
+        </p:spPr>
+      </p:pic>
+      <p:sp>
+        <p:nvSpPr>
+          <p:cNvPr id="2" name="Title 1"/>
+          <p:cNvSpPr>
+            <a:spLocks noGrp="1"/>
+          </p:cNvSpPr>
+          <p:nvPr>
+            <p:ph type="title"/>
+          </p:nvPr>
+        </p:nvSpPr>
+        <p:spPr/>
+        <p:txBody>
+          <a:bodyPr/>
+          <a:lstStyle/>
+          <a:p>
+            <a:r>
+              <a:rPr lang="en-US" dirty="0" smtClean="0"/>
+              <a:t>Game State Machine</a:t>
+            </a:r>
+            <a:endParaRPr lang="en-US" dirty="0"/>
+          </a:p>
+        </p:txBody>
+      </p:sp>
+    </p:spTree>
+    <p:extLst>
+      <p:ext uri="{BB962C8B-B14F-4D97-AF65-F5344CB8AC3E}">
+        <p14:creationId xmlns:p14="http://schemas.microsoft.com/office/powerpoint/2010/main" val="4281443412"/>
+      </p:ext>
+    </p:extLst>
+  </p:cSld>
+  <p:clrMapOvr>
+    <a:masterClrMapping/>
+  </p:clrMapOvr>
+  <p:timing>
+    <p:tnLst>
+      <p:par>
+        <p:cTn xmlns:p14="http://schemas.microsoft.com/office/powerpoint/2010/main" id="1" dur="indefinite" restart="never" nodeType="tmRoot"/>
+      </p:par>
+    </p:tnLst>
+  </p:timing>
+</p:sld>
+</file>
+
+<file path=ppt/slides/slide7.xml><?xml version="1.0" encoding="utf-8"?>
+<p:sld xmlns:a="http://schemas.openxmlformats.org/drawingml/2006/main" xmlns:r="http://schemas.openxmlformats.org/officeDocument/2006/relationships" xmlns:p="http://schemas.openxmlformats.org/presentationml/2006/main">
+  <p:cSld>
+    <p:spTree>
+      <p:nvGrpSpPr>
+        <p:cNvPr id="1" name=""/>
+        <p:cNvGrpSpPr/>
+        <p:nvPr/>
+      </p:nvGrpSpPr>
+      <p:grpSpPr>
+        <a:xfrm>
+          <a:off x="0" y="0"/>
+          <a:ext cx="0" cy="0"/>
+          <a:chOff x="0" y="0"/>
+          <a:chExt cx="0" cy="0"/>
+        </a:xfrm>
+      </p:grpSpPr>
+      <p:sp>
+        <p:nvSpPr>
+          <p:cNvPr id="2" name="Title 1"/>
+          <p:cNvSpPr>
+            <a:spLocks noGrp="1"/>
+          </p:cNvSpPr>
+          <p:nvPr>
+            <p:ph type="title"/>
+          </p:nvPr>
+        </p:nvSpPr>
+        <p:spPr/>
+        <p:txBody>
+          <a:bodyPr/>
+          <a:lstStyle/>
+          <a:p>
+            <a:r>
+              <a:rPr lang="en-US" dirty="0" smtClean="0"/>
+              <a:t>(Musical) Score </a:t>
+            </a:r>
+            <a:r>
+              <a:rPr lang="en-US" dirty="0" smtClean="0"/>
+              <a:t>Loader</a:t>
+            </a:r>
+            <a:endParaRPr lang="en-US" dirty="0"/>
+          </a:p>
+        </p:txBody>
+      </p:sp>
+      <p:pic>
+        <p:nvPicPr>
+          <p:cNvPr id="4" name="Content Placeholder 3"/>
+          <p:cNvPicPr>
+            <a:picLocks noGrp="1" noChangeAspect="1"/>
+          </p:cNvPicPr>
+          <p:nvPr>
+            <p:ph idx="1"/>
+          </p:nvPr>
+        </p:nvPicPr>
+        <p:blipFill>
+          <a:blip r:embed="rId2">
+            <a:extLst>
+              <a:ext uri="{28A0092B-C50C-407E-A947-70E740481C1C}">
+                <a14:useLocalDpi xmlns:a14="http://schemas.microsoft.com/office/drawing/2010/main" val="0"/>
+              </a:ext>
+            </a:extLst>
+          </a:blip>
+          <a:stretch>
+            <a:fillRect/>
+          </a:stretch>
+        </p:blipFill>
+        <p:spPr>
+          <a:xfrm>
+            <a:off x="457200" y="1447800"/>
+            <a:ext cx="8003909" cy="3048000"/>
+          </a:xfrm>
+        </p:spPr>
+      </p:pic>
+      <p:sp>
+        <p:nvSpPr>
+          <p:cNvPr id="3" name="Rectangle 2"/>
+          <p:cNvSpPr/>
+          <p:nvPr/>
+        </p:nvSpPr>
+        <p:spPr>
+          <a:xfrm>
+            <a:off x="685800" y="4800600"/>
+            <a:ext cx="2031325" cy="1200329"/>
+          </a:xfrm>
+          <a:prstGeom prst="rect">
+            <a:avLst/>
+          </a:prstGeom>
+        </p:spPr>
+        <p:txBody>
+          <a:bodyPr wrap="none">
+            <a:spAutoFit/>
+          </a:bodyPr>
+          <a:lstStyle/>
+          <a:p>
+            <a:r>
+              <a:rPr lang="en-US" sz="7200" dirty="0" smtClean="0">
+                <a:latin typeface="ＭＳ ゴシック"/>
+                <a:ea typeface="ＭＳ ゴシック"/>
+                <a:cs typeface="ＭＳ ゴシック"/>
+              </a:rPr>
+              <a:t>♫♬♬</a:t>
+            </a:r>
+            <a:r>
+              <a:rPr lang="en-US" sz="7200" dirty="0">
+                <a:latin typeface="ＭＳ ゴシック"/>
+                <a:ea typeface="ＭＳ ゴシック"/>
+                <a:cs typeface="ＭＳ ゴシック"/>
+              </a:rPr>
+              <a:t>♩</a:t>
+            </a:r>
+            <a:endParaRPr lang="en-US" sz="7200" dirty="0"/>
+          </a:p>
+        </p:txBody>
+      </p:sp>
+      <p:cxnSp>
+        <p:nvCxnSpPr>
+          <p:cNvPr id="6" name="Straight Arrow Connector 5"/>
+          <p:cNvCxnSpPr/>
+          <p:nvPr/>
+        </p:nvCxnSpPr>
+        <p:spPr>
+          <a:xfrm>
+            <a:off x="2819400" y="5410200"/>
+            <a:ext cx="1447800" cy="0"/>
+          </a:xfrm>
+          <a:prstGeom prst="straightConnector1">
+            <a:avLst/>
+          </a:prstGeom>
+          <a:ln>
+            <a:solidFill>
+              <a:schemeClr val="tx1"/>
+            </a:solidFill>
+            <a:tailEnd type="arrow"/>
+          </a:ln>
+        </p:spPr>
+        <p:style>
+          <a:lnRef idx="2">
+            <a:schemeClr val="accent1"/>
+          </a:lnRef>
+          <a:fillRef idx="0">
+            <a:schemeClr val="accent1"/>
+          </a:fillRef>
+          <a:effectRef idx="1">
+            <a:schemeClr val="accent1"/>
+          </a:effectRef>
+          <a:fontRef idx="minor">
+            <a:schemeClr val="tx1"/>
+          </a:fontRef>
+        </p:style>
+      </p:cxnSp>
+      <p:sp>
+        <p:nvSpPr>
+          <p:cNvPr id="7" name="TextBox 6"/>
+          <p:cNvSpPr txBox="1"/>
+          <p:nvPr/>
+        </p:nvSpPr>
+        <p:spPr>
+          <a:xfrm>
+            <a:off x="4724400" y="5029200"/>
+            <a:ext cx="4191000" cy="769441"/>
+          </a:xfrm>
+          <a:prstGeom prst="rect">
+            <a:avLst/>
+          </a:prstGeom>
+          <a:noFill/>
+        </p:spPr>
+        <p:txBody>
+          <a:bodyPr wrap="square" rtlCol="0">
+            <a:spAutoFit/>
+          </a:bodyPr>
+          <a:lstStyle/>
+          <a:p>
+            <a:r>
+              <a:rPr lang="en-US" sz="4400" dirty="0" smtClean="0"/>
+              <a:t>64’h39952155…</a:t>
+            </a:r>
+            <a:endParaRPr lang="en-US" sz="4400" dirty="0"/>
+          </a:p>
+        </p:txBody>
+      </p:sp>
+    </p:spTree>
+    <p:extLst>
+      <p:ext uri="{BB962C8B-B14F-4D97-AF65-F5344CB8AC3E}">
+        <p14:creationId xmlns:p14="http://schemas.microsoft.com/office/powerpoint/2010/main" val="891919966"/>
+      </p:ext>
+    </p:extLst>
+  </p:cSld>
+  <p:clrMapOvr>
+    <a:masterClrMapping/>
+  </p:clrMapOvr>
+  <p:timing>
+    <p:tnLst>
+      <p:par>
+        <p:cTn xmlns:p14="http://schemas.microsoft.com/office/powerpoint/2010/main" id="1" dur="indefinite" restart="never" nodeType="tmRoot"/>
+      </p:par>
+    </p:tnLst>
+  </p:timing>
+</p:sld>
+</file>
+
+<file path=ppt/slides/slide8.xml><?xml version="1.0" encoding="utf-8"?>
+<p:sld xmlns:a="http://schemas.openxmlformats.org/drawingml/2006/main" xmlns:r="http://schemas.openxmlformats.org/officeDocument/2006/relationships" xmlns:p="http://schemas.openxmlformats.org/presentationml/2006/main">
+  <p:cSld>
+    <p:spTree>
+      <p:nvGrpSpPr>
+        <p:cNvPr id="1" name=""/>
+        <p:cNvGrpSpPr/>
+        <p:nvPr/>
+      </p:nvGrpSpPr>
+      <p:grpSpPr>
+        <a:xfrm>
+          <a:off x="0" y="0"/>
+          <a:ext cx="0" cy="0"/>
+          <a:chOff x="0" y="0"/>
+          <a:chExt cx="0" cy="0"/>
+        </a:xfrm>
+      </p:grpSpPr>
+      <p:sp>
+        <p:nvSpPr>
+          <p:cNvPr id="2" name="Title 1"/>
+          <p:cNvSpPr>
+            <a:spLocks noGrp="1"/>
+          </p:cNvSpPr>
+          <p:nvPr>
+            <p:ph type="title"/>
+          </p:nvPr>
+        </p:nvSpPr>
+        <p:spPr/>
+        <p:txBody>
+          <a:bodyPr/>
+          <a:lstStyle/>
+          <a:p>
+            <a:r>
+              <a:rPr lang="en-US" dirty="0" smtClean="0"/>
+              <a:t>Display</a:t>
+            </a:r>
+            <a:endParaRPr lang="en-US" dirty="0"/>
+          </a:p>
+        </p:txBody>
+      </p:sp>
+      <p:pic>
+        <p:nvPicPr>
+          <p:cNvPr id="4" name="Content Placeholder 3"/>
+          <p:cNvPicPr>
+            <a:picLocks noGrp="1" noChangeAspect="1"/>
+          </p:cNvPicPr>
+          <p:nvPr>
+            <p:ph idx="1"/>
+          </p:nvPr>
+        </p:nvPicPr>
+        <p:blipFill>
+          <a:blip r:embed="rId2">
+            <a:extLst>
+              <a:ext uri="{28A0092B-C50C-407E-A947-70E740481C1C}">
+                <a14:useLocalDpi xmlns:a14="http://schemas.microsoft.com/office/drawing/2010/main" val="0"/>
+              </a:ext>
+            </a:extLst>
+          </a:blip>
+          <a:stretch>
+            <a:fillRect/>
+          </a:stretch>
+        </p:blipFill>
+        <p:spPr>
+          <a:xfrm>
+            <a:off x="-15110" y="1676400"/>
+            <a:ext cx="9113974" cy="4114800"/>
+          </a:xfrm>
+        </p:spPr>
+      </p:pic>
+    </p:spTree>
+    <p:extLst>
+      <p:ext uri="{BB962C8B-B14F-4D97-AF65-F5344CB8AC3E}">
+        <p14:creationId xmlns:p14="http://schemas.microsoft.com/office/powerpoint/2010/main" val="4017615296"/>
+      </p:ext>
+    </p:extLst>
+  </p:cSld>
+  <p:clrMapOvr>
+    <a:masterClrMapping/>
+  </p:clrMapOvr>
+  <p:timing>
+    <p:tnLst>
+      <p:par>
+        <p:cTn xmlns:p14="http://schemas.microsoft.com/office/powerpoint/2010/main" id="1" dur="indefinite" restart="never" nodeType="tmRoot"/>
+      </p:par>
+    </p:tnLst>
+  </p:timing>
+</p:sld>
+</file>
+
+<file path=ppt/slides/slide9.xml><?xml version="1.0" encoding="utf-8"?>
 <p:sld xmlns:a="http://schemas.openxmlformats.org/drawingml/2006/main" xmlns:r="http://schemas.openxmlformats.org/officeDocument/2006/relationships" xmlns:p="http://schemas.openxmlformats.org/presentationml/2006/main">
   <p:cSld>
     <p:bg>
@@ -5173,464 +5830,7 @@
   <p:timing>
     <p:tnLst>
       <p:par>
-        <p:cTn id="1" dur="indefinite" restart="never" nodeType="tmRoot"/>
-      </p:par>
-    </p:tnLst>
-  </p:timing>
-</p:sld>
-</file>
-
-<file path=ppt/slides/slide5.xml><?xml version="1.0" encoding="utf-8"?>
-<p:sld xmlns:a="http://schemas.openxmlformats.org/drawingml/2006/main" xmlns:r="http://schemas.openxmlformats.org/officeDocument/2006/relationships" xmlns:p="http://schemas.openxmlformats.org/presentationml/2006/main">
-  <p:cSld>
-    <p:spTree>
-      <p:nvGrpSpPr>
-        <p:cNvPr id="1" name=""/>
-        <p:cNvGrpSpPr/>
-        <p:nvPr/>
-      </p:nvGrpSpPr>
-      <p:grpSpPr>
-        <a:xfrm>
-          <a:off x="0" y="0"/>
-          <a:ext cx="0" cy="0"/>
-          <a:chOff x="0" y="0"/>
-          <a:chExt cx="0" cy="0"/>
-        </a:xfrm>
-      </p:grpSpPr>
-      <p:sp>
-        <p:nvSpPr>
-          <p:cNvPr id="2" name="Title 1"/>
-          <p:cNvSpPr>
-            <a:spLocks noGrp="1"/>
-          </p:cNvSpPr>
-          <p:nvPr>
-            <p:ph type="title"/>
-          </p:nvPr>
-        </p:nvSpPr>
-        <p:spPr/>
-        <p:txBody>
-          <a:bodyPr/>
-          <a:lstStyle/>
-          <a:p>
-            <a:r>
-              <a:rPr lang="en-US" dirty="0" smtClean="0"/>
-              <a:t>Technical Overview</a:t>
-            </a:r>
-            <a:endParaRPr lang="en-US" dirty="0"/>
-          </a:p>
-        </p:txBody>
-      </p:sp>
-      <p:sp>
-        <p:nvSpPr>
-          <p:cNvPr id="3" name="Content Placeholder 2"/>
-          <p:cNvSpPr>
-            <a:spLocks noGrp="1"/>
-          </p:cNvSpPr>
-          <p:nvPr>
-            <p:ph idx="1"/>
-          </p:nvPr>
-        </p:nvSpPr>
-        <p:spPr/>
-        <p:txBody>
-          <a:bodyPr/>
-          <a:lstStyle/>
-          <a:p>
-            <a:r>
-              <a:rPr lang="en-US" dirty="0" smtClean="0"/>
-              <a:t>FFT</a:t>
-            </a:r>
-          </a:p>
-          <a:p>
-            <a:r>
-              <a:rPr lang="en-US" dirty="0" smtClean="0"/>
-              <a:t>Game State Machine</a:t>
-            </a:r>
-          </a:p>
-          <a:p>
-            <a:r>
-              <a:rPr lang="en-US" dirty="0" smtClean="0"/>
-              <a:t>Video</a:t>
-            </a:r>
-          </a:p>
-          <a:p>
-            <a:r>
-              <a:rPr lang="en-US" dirty="0" smtClean="0"/>
-              <a:t>Musical Score</a:t>
-            </a:r>
-            <a:endParaRPr lang="en-US" dirty="0"/>
-          </a:p>
-        </p:txBody>
-      </p:sp>
-    </p:spTree>
-    <p:extLst>
-      <p:ext uri="{BB962C8B-B14F-4D97-AF65-F5344CB8AC3E}">
-        <p14:creationId xmlns:p14="http://schemas.microsoft.com/office/powerpoint/2010/main" val="150717875"/>
-      </p:ext>
-    </p:extLst>
-  </p:cSld>
-  <p:clrMapOvr>
-    <a:masterClrMapping/>
-  </p:clrMapOvr>
-  <p:timing>
-    <p:tnLst>
-      <p:par>
-        <p:cTn id="1" dur="indefinite" restart="never" nodeType="tmRoot"/>
-      </p:par>
-    </p:tnLst>
-  </p:timing>
-</p:sld>
-</file>
-
-<file path=ppt/slides/slide6.xml><?xml version="1.0" encoding="utf-8"?>
-<p:sld xmlns:a="http://schemas.openxmlformats.org/drawingml/2006/main" xmlns:r="http://schemas.openxmlformats.org/officeDocument/2006/relationships" xmlns:p="http://schemas.openxmlformats.org/presentationml/2006/main">
-  <p:cSld>
-    <p:spTree>
-      <p:nvGrpSpPr>
-        <p:cNvPr id="1" name=""/>
-        <p:cNvGrpSpPr/>
-        <p:nvPr/>
-      </p:nvGrpSpPr>
-      <p:grpSpPr>
-        <a:xfrm>
-          <a:off x="0" y="0"/>
-          <a:ext cx="0" cy="0"/>
-          <a:chOff x="0" y="0"/>
-          <a:chExt cx="0" cy="0"/>
-        </a:xfrm>
-      </p:grpSpPr>
-      <p:sp>
-        <p:nvSpPr>
-          <p:cNvPr id="2" name="Title 1"/>
-          <p:cNvSpPr>
-            <a:spLocks noGrp="1"/>
-          </p:cNvSpPr>
-          <p:nvPr>
-            <p:ph type="title"/>
-          </p:nvPr>
-        </p:nvSpPr>
-        <p:spPr/>
-        <p:txBody>
-          <a:bodyPr/>
-          <a:lstStyle/>
-          <a:p>
-            <a:r>
-              <a:rPr lang="en-US" dirty="0" smtClean="0"/>
-              <a:t>Overall Block Diagram</a:t>
-            </a:r>
-            <a:endParaRPr lang="en-US" dirty="0"/>
-          </a:p>
-        </p:txBody>
-      </p:sp>
-      <p:pic>
-        <p:nvPicPr>
-          <p:cNvPr id="7" name="Content Placeholder 6"/>
-          <p:cNvPicPr>
-            <a:picLocks noGrp="1" noChangeAspect="1"/>
-          </p:cNvPicPr>
-          <p:nvPr>
-            <p:ph idx="1"/>
-          </p:nvPr>
-        </p:nvPicPr>
-        <p:blipFill>
-          <a:blip r:embed="rId2">
-            <a:extLst>
-              <a:ext uri="{28A0092B-C50C-407E-A947-70E740481C1C}">
-                <a14:useLocalDpi xmlns:a14="http://schemas.microsoft.com/office/drawing/2010/main" val="0"/>
-              </a:ext>
-            </a:extLst>
-          </a:blip>
-          <a:stretch>
-            <a:fillRect/>
-          </a:stretch>
-        </p:blipFill>
-        <p:spPr>
-          <a:xfrm>
-            <a:off x="609600" y="1752600"/>
-            <a:ext cx="7506595" cy="3733800"/>
-          </a:xfrm>
-        </p:spPr>
-      </p:pic>
-    </p:spTree>
-    <p:extLst>
-      <p:ext uri="{BB962C8B-B14F-4D97-AF65-F5344CB8AC3E}">
-        <p14:creationId xmlns:p14="http://schemas.microsoft.com/office/powerpoint/2010/main" val="3582768376"/>
-      </p:ext>
-    </p:extLst>
-  </p:cSld>
-  <p:clrMapOvr>
-    <a:masterClrMapping/>
-  </p:clrMapOvr>
-  <p:timing>
-    <p:tnLst>
-      <p:par>
-        <p:cTn id="1" dur="indefinite" restart="never" nodeType="tmRoot"/>
-      </p:par>
-    </p:tnLst>
-  </p:timing>
-</p:sld>
-</file>
-
-<file path=ppt/slides/slide7.xml><?xml version="1.0" encoding="utf-8"?>
-<p:sld xmlns:a="http://schemas.openxmlformats.org/drawingml/2006/main" xmlns:r="http://schemas.openxmlformats.org/officeDocument/2006/relationships" xmlns:p="http://schemas.openxmlformats.org/presentationml/2006/main">
-  <p:cSld>
-    <p:spTree>
-      <p:nvGrpSpPr>
-        <p:cNvPr id="1" name=""/>
-        <p:cNvGrpSpPr/>
-        <p:nvPr/>
-      </p:nvGrpSpPr>
-      <p:grpSpPr>
-        <a:xfrm>
-          <a:off x="0" y="0"/>
-          <a:ext cx="0" cy="0"/>
-          <a:chOff x="0" y="0"/>
-          <a:chExt cx="0" cy="0"/>
-        </a:xfrm>
-      </p:grpSpPr>
-      <p:sp>
-        <p:nvSpPr>
-          <p:cNvPr id="2" name="Title 1"/>
-          <p:cNvSpPr>
-            <a:spLocks noGrp="1"/>
-          </p:cNvSpPr>
-          <p:nvPr>
-            <p:ph type="title"/>
-          </p:nvPr>
-        </p:nvSpPr>
-        <p:spPr/>
-        <p:txBody>
-          <a:bodyPr/>
-          <a:lstStyle/>
-          <a:p>
-            <a:r>
-              <a:rPr lang="en-US" dirty="0" smtClean="0"/>
-              <a:t>Note Identification</a:t>
-            </a:r>
-            <a:endParaRPr lang="en-US" dirty="0"/>
-          </a:p>
-        </p:txBody>
-      </p:sp>
-      <p:pic>
-        <p:nvPicPr>
-          <p:cNvPr id="6" name="Content Placeholder 5"/>
-          <p:cNvPicPr>
-            <a:picLocks noGrp="1" noChangeAspect="1"/>
-          </p:cNvPicPr>
-          <p:nvPr>
-            <p:ph idx="1"/>
-          </p:nvPr>
-        </p:nvPicPr>
-        <p:blipFill>
-          <a:blip r:embed="rId2">
-            <a:extLst>
-              <a:ext uri="{28A0092B-C50C-407E-A947-70E740481C1C}">
-                <a14:useLocalDpi xmlns:a14="http://schemas.microsoft.com/office/drawing/2010/main" val="0"/>
-              </a:ext>
-            </a:extLst>
-          </a:blip>
-          <a:stretch>
-            <a:fillRect/>
-          </a:stretch>
-        </p:blipFill>
-        <p:spPr>
-          <a:xfrm>
-            <a:off x="914400" y="1676400"/>
-            <a:ext cx="6815193" cy="3581400"/>
-          </a:xfrm>
-        </p:spPr>
-      </p:pic>
-    </p:spTree>
-    <p:extLst>
-      <p:ext uri="{BB962C8B-B14F-4D97-AF65-F5344CB8AC3E}">
-        <p14:creationId xmlns:p14="http://schemas.microsoft.com/office/powerpoint/2010/main" val="2836285147"/>
-      </p:ext>
-    </p:extLst>
-  </p:cSld>
-  <p:clrMapOvr>
-    <a:masterClrMapping/>
-  </p:clrMapOvr>
-  <p:timing>
-    <p:tnLst>
-      <p:par>
-        <p:cTn id="1" dur="indefinite" restart="never" nodeType="tmRoot"/>
-      </p:par>
-    </p:tnLst>
-  </p:timing>
-</p:sld>
-</file>
-
-<file path=ppt/slides/slide8.xml><?xml version="1.0" encoding="utf-8"?>
-<p:sld xmlns:a="http://schemas.openxmlformats.org/drawingml/2006/main" xmlns:r="http://schemas.openxmlformats.org/officeDocument/2006/relationships" xmlns:p="http://schemas.openxmlformats.org/presentationml/2006/main">
-  <p:cSld>
-    <p:spTree>
-      <p:nvGrpSpPr>
-        <p:cNvPr id="1" name=""/>
-        <p:cNvGrpSpPr/>
-        <p:nvPr/>
-      </p:nvGrpSpPr>
-      <p:grpSpPr>
-        <a:xfrm>
-          <a:off x="0" y="0"/>
-          <a:ext cx="0" cy="0"/>
-          <a:chOff x="0" y="0"/>
-          <a:chExt cx="0" cy="0"/>
-        </a:xfrm>
-      </p:grpSpPr>
-      <p:sp>
-        <p:nvSpPr>
-          <p:cNvPr id="2" name="Title 1"/>
-          <p:cNvSpPr>
-            <a:spLocks noGrp="1"/>
-          </p:cNvSpPr>
-          <p:nvPr>
-            <p:ph type="title"/>
-          </p:nvPr>
-        </p:nvSpPr>
-        <p:spPr/>
-        <p:txBody>
-          <a:bodyPr/>
-          <a:lstStyle/>
-          <a:p>
-            <a:r>
-              <a:rPr lang="en-US" dirty="0" smtClean="0"/>
-              <a:t>Game State Machine</a:t>
-            </a:r>
-            <a:endParaRPr lang="en-US" dirty="0"/>
-          </a:p>
-        </p:txBody>
-      </p:sp>
-      <p:pic>
-        <p:nvPicPr>
-          <p:cNvPr id="4" name="Content Placeholder 3"/>
-          <p:cNvPicPr>
-            <a:picLocks noGrp="1" noChangeAspect="1"/>
-          </p:cNvPicPr>
-          <p:nvPr>
-            <p:ph idx="1"/>
-          </p:nvPr>
-        </p:nvPicPr>
-        <p:blipFill>
-          <a:blip r:embed="rId2">
-            <a:extLst>
-              <a:ext uri="{28A0092B-C50C-407E-A947-70E740481C1C}">
-                <a14:useLocalDpi xmlns:a14="http://schemas.microsoft.com/office/drawing/2010/main" val="0"/>
-              </a:ext>
-            </a:extLst>
-          </a:blip>
-          <a:stretch>
-            <a:fillRect/>
-          </a:stretch>
-        </p:blipFill>
-        <p:spPr>
-          <a:xfrm>
-            <a:off x="1524000" y="1295400"/>
-            <a:ext cx="5791200" cy="4517350"/>
-          </a:xfrm>
-        </p:spPr>
-      </p:pic>
-    </p:spTree>
-    <p:extLst>
-      <p:ext uri="{BB962C8B-B14F-4D97-AF65-F5344CB8AC3E}">
-        <p14:creationId xmlns:p14="http://schemas.microsoft.com/office/powerpoint/2010/main" val="4281443412"/>
-      </p:ext>
-    </p:extLst>
-  </p:cSld>
-  <p:clrMapOvr>
-    <a:masterClrMapping/>
-  </p:clrMapOvr>
-  <p:timing>
-    <p:tnLst>
-      <p:par>
-        <p:cTn id="1" dur="indefinite" restart="never" nodeType="tmRoot"/>
-      </p:par>
-    </p:tnLst>
-  </p:timing>
-</p:sld>
-</file>
-
-<file path=ppt/slides/slide9.xml><?xml version="1.0" encoding="utf-8"?>
-<p:sld xmlns:a="http://schemas.openxmlformats.org/drawingml/2006/main" xmlns:r="http://schemas.openxmlformats.org/officeDocument/2006/relationships" xmlns:p="http://schemas.openxmlformats.org/presentationml/2006/main">
-  <p:cSld>
-    <p:spTree>
-      <p:nvGrpSpPr>
-        <p:cNvPr id="1" name=""/>
-        <p:cNvGrpSpPr/>
-        <p:nvPr/>
-      </p:nvGrpSpPr>
-      <p:grpSpPr>
-        <a:xfrm>
-          <a:off x="0" y="0"/>
-          <a:ext cx="0" cy="0"/>
-          <a:chOff x="0" y="0"/>
-          <a:chExt cx="0" cy="0"/>
-        </a:xfrm>
-      </p:grpSpPr>
-      <p:sp>
-        <p:nvSpPr>
-          <p:cNvPr id="2" name="Title 1"/>
-          <p:cNvSpPr>
-            <a:spLocks noGrp="1"/>
-          </p:cNvSpPr>
-          <p:nvPr>
-            <p:ph type="title"/>
-          </p:nvPr>
-        </p:nvSpPr>
-        <p:spPr/>
-        <p:txBody>
-          <a:bodyPr/>
-          <a:lstStyle/>
-          <a:p>
-            <a:r>
-              <a:rPr lang="en-US" dirty="0" smtClean="0"/>
-              <a:t>Score Loader</a:t>
-            </a:r>
-            <a:endParaRPr lang="en-US" dirty="0"/>
-          </a:p>
-        </p:txBody>
-      </p:sp>
-      <p:pic>
-        <p:nvPicPr>
-          <p:cNvPr id="4" name="Content Placeholder 3"/>
-          <p:cNvPicPr>
-            <a:picLocks noGrp="1" noChangeAspect="1"/>
-          </p:cNvPicPr>
-          <p:nvPr>
-            <p:ph idx="1"/>
-          </p:nvPr>
-        </p:nvPicPr>
-        <p:blipFill>
-          <a:blip r:embed="rId2">
-            <a:extLst>
-              <a:ext uri="{28A0092B-C50C-407E-A947-70E740481C1C}">
-                <a14:useLocalDpi xmlns:a14="http://schemas.microsoft.com/office/drawing/2010/main" val="0"/>
-              </a:ext>
-            </a:extLst>
-          </a:blip>
-          <a:stretch>
-            <a:fillRect/>
-          </a:stretch>
-        </p:blipFill>
-        <p:spPr>
-          <a:xfrm>
-            <a:off x="762000" y="2209800"/>
-            <a:ext cx="7203518" cy="2743200"/>
-          </a:xfrm>
-        </p:spPr>
-      </p:pic>
-    </p:spTree>
-    <p:extLst>
-      <p:ext uri="{BB962C8B-B14F-4D97-AF65-F5344CB8AC3E}">
-        <p14:creationId xmlns:p14="http://schemas.microsoft.com/office/powerpoint/2010/main" val="891919966"/>
-      </p:ext>
-    </p:extLst>
-  </p:cSld>
-  <p:clrMapOvr>
-    <a:masterClrMapping/>
-  </p:clrMapOvr>
-  <p:timing>
-    <p:tnLst>
-      <p:par>
-        <p:cTn id="1" dur="indefinite" restart="never" nodeType="tmRoot"/>
+        <p:cTn xmlns:p14="http://schemas.microsoft.com/office/powerpoint/2010/main" id="1" dur="indefinite" restart="never" nodeType="tmRoot"/>
       </p:par>
     </p:tnLst>
   </p:timing>

</xml_diff>